<commit_message>
Update Project 1 - Final presentation.pptx
</commit_message>
<xml_diff>
--- a/Doc/Project 1 - Final presentation.pptx
+++ b/Doc/Project 1 - Final presentation.pptx
@@ -1,6 +1,6 @@
 
 <file path=ppt/presentation.xml><?xml version="1.0" encoding="utf-8"?>
-<p:presentation xmlns:a="http://schemas.openxmlformats.org/drawingml/2006/main" xmlns:r="http://schemas.openxmlformats.org/officeDocument/2006/relationships" xmlns:p="http://schemas.openxmlformats.org/presentationml/2006/main" saveSubsetFonts="1" autoCompressPictures="0">
+<p:presentation xmlns:a="http://schemas.openxmlformats.org/drawingml/2006/main" xmlns:r="http://schemas.openxmlformats.org/officeDocument/2006/relationships" xmlns:p="http://schemas.openxmlformats.org/presentationml/2006/main" showSpecialPlsOnTitleSld="0" saveSubsetFonts="1" autoCompressPictures="0">
   <p:sldMasterIdLst>
     <p:sldMasterId id="2147483648" r:id="rId1"/>
   </p:sldMasterIdLst>
@@ -1435,9 +1435,9 @@
           <a:bodyPr/>
           <a:lstStyle/>
           <a:p>
-            <a:fld id="{7C06B828-B815-F446-BC49-4CE521295E37}" type="datetimeFigureOut">
-              <a:rPr lang="it-IT" smtClean="0"/>
-              <a:t>01/05/25</a:t>
+            <a:fld id="{6271CF65-4597-7E49-BADA-E6D82E3E4454}" type="datetime1">
+              <a:rPr lang="it-CH" smtClean="0"/>
+              <a:t>01.05.25</a:t>
             </a:fld>
             <a:endParaRPr lang="it-IT"/>
           </a:p>
@@ -1633,9 +1633,9 @@
           <a:bodyPr/>
           <a:lstStyle/>
           <a:p>
-            <a:fld id="{7C06B828-B815-F446-BC49-4CE521295E37}" type="datetimeFigureOut">
-              <a:rPr lang="it-IT" smtClean="0"/>
-              <a:t>01/05/25</a:t>
+            <a:fld id="{EE6CDB17-BEED-B443-A46A-D19EDCEA7723}" type="datetime1">
+              <a:rPr lang="it-CH" smtClean="0"/>
+              <a:t>01.05.25</a:t>
             </a:fld>
             <a:endParaRPr lang="it-IT"/>
           </a:p>
@@ -1841,9 +1841,9 @@
           <a:bodyPr/>
           <a:lstStyle/>
           <a:p>
-            <a:fld id="{7C06B828-B815-F446-BC49-4CE521295E37}" type="datetimeFigureOut">
-              <a:rPr lang="it-IT" smtClean="0"/>
-              <a:t>01/05/25</a:t>
+            <a:fld id="{E9ADA071-A94E-CC46-A15A-5FB1B7CC10E5}" type="datetime1">
+              <a:rPr lang="it-CH" smtClean="0"/>
+              <a:t>01.05.25</a:t>
             </a:fld>
             <a:endParaRPr lang="it-IT"/>
           </a:p>
@@ -2039,9 +2039,9 @@
           <a:bodyPr/>
           <a:lstStyle/>
           <a:p>
-            <a:fld id="{7C06B828-B815-F446-BC49-4CE521295E37}" type="datetimeFigureOut">
-              <a:rPr lang="it-IT" smtClean="0"/>
-              <a:t>01/05/25</a:t>
+            <a:fld id="{70643E7D-2C94-CF48-953A-073F844AC652}" type="datetime1">
+              <a:rPr lang="it-CH" smtClean="0"/>
+              <a:t>01.05.25</a:t>
             </a:fld>
             <a:endParaRPr lang="it-IT"/>
           </a:p>
@@ -2314,9 +2314,9 @@
           <a:bodyPr/>
           <a:lstStyle/>
           <a:p>
-            <a:fld id="{7C06B828-B815-F446-BC49-4CE521295E37}" type="datetimeFigureOut">
-              <a:rPr lang="it-IT" smtClean="0"/>
-              <a:t>01/05/25</a:t>
+            <a:fld id="{10B382B9-94A9-1043-A14C-802E57D17BD6}" type="datetime1">
+              <a:rPr lang="it-CH" smtClean="0"/>
+              <a:t>01.05.25</a:t>
             </a:fld>
             <a:endParaRPr lang="it-IT"/>
           </a:p>
@@ -2579,9 +2579,9 @@
           <a:bodyPr/>
           <a:lstStyle/>
           <a:p>
-            <a:fld id="{7C06B828-B815-F446-BC49-4CE521295E37}" type="datetimeFigureOut">
-              <a:rPr lang="it-IT" smtClean="0"/>
-              <a:t>01/05/25</a:t>
+            <a:fld id="{5407BC09-C06D-6547-A687-8184047371EB}" type="datetime1">
+              <a:rPr lang="it-CH" smtClean="0"/>
+              <a:t>01.05.25</a:t>
             </a:fld>
             <a:endParaRPr lang="it-IT"/>
           </a:p>
@@ -2991,9 +2991,9 @@
           <a:bodyPr/>
           <a:lstStyle/>
           <a:p>
-            <a:fld id="{7C06B828-B815-F446-BC49-4CE521295E37}" type="datetimeFigureOut">
-              <a:rPr lang="it-IT" smtClean="0"/>
-              <a:t>01/05/25</a:t>
+            <a:fld id="{962EAB29-7C9D-6F49-9CBC-50C4927279D9}" type="datetime1">
+              <a:rPr lang="it-CH" smtClean="0"/>
+              <a:t>01.05.25</a:t>
             </a:fld>
             <a:endParaRPr lang="it-IT"/>
           </a:p>
@@ -3132,9 +3132,9 @@
           <a:bodyPr/>
           <a:lstStyle/>
           <a:p>
-            <a:fld id="{7C06B828-B815-F446-BC49-4CE521295E37}" type="datetimeFigureOut">
-              <a:rPr lang="it-IT" smtClean="0"/>
-              <a:t>01/05/25</a:t>
+            <a:fld id="{2169879A-BDAB-3845-A9AA-B070637BE786}" type="datetime1">
+              <a:rPr lang="it-CH" smtClean="0"/>
+              <a:t>01.05.25</a:t>
             </a:fld>
             <a:endParaRPr lang="it-IT"/>
           </a:p>
@@ -3245,9 +3245,9 @@
           <a:bodyPr/>
           <a:lstStyle/>
           <a:p>
-            <a:fld id="{7C06B828-B815-F446-BC49-4CE521295E37}" type="datetimeFigureOut">
-              <a:rPr lang="it-IT" smtClean="0"/>
-              <a:t>01/05/25</a:t>
+            <a:fld id="{386FFFC6-73D1-3442-A0A8-981F68222DDC}" type="datetime1">
+              <a:rPr lang="it-CH" smtClean="0"/>
+              <a:t>01.05.25</a:t>
             </a:fld>
             <a:endParaRPr lang="it-IT"/>
           </a:p>
@@ -3556,9 +3556,9 @@
           <a:bodyPr/>
           <a:lstStyle/>
           <a:p>
-            <a:fld id="{7C06B828-B815-F446-BC49-4CE521295E37}" type="datetimeFigureOut">
-              <a:rPr lang="it-IT" smtClean="0"/>
-              <a:t>01/05/25</a:t>
+            <a:fld id="{EF02A7B5-5B53-A34B-848C-7F446D930188}" type="datetime1">
+              <a:rPr lang="it-CH" smtClean="0"/>
+              <a:t>01.05.25</a:t>
             </a:fld>
             <a:endParaRPr lang="it-IT"/>
           </a:p>
@@ -3844,9 +3844,9 @@
           <a:bodyPr/>
           <a:lstStyle/>
           <a:p>
-            <a:fld id="{7C06B828-B815-F446-BC49-4CE521295E37}" type="datetimeFigureOut">
-              <a:rPr lang="it-IT" smtClean="0"/>
-              <a:t>01/05/25</a:t>
+            <a:fld id="{212CB2D2-4278-8F40-925C-82456F034883}" type="datetime1">
+              <a:rPr lang="it-CH" smtClean="0"/>
+              <a:t>01.05.25</a:t>
             </a:fld>
             <a:endParaRPr lang="it-IT"/>
           </a:p>
@@ -4085,9 +4085,9 @@
             </a:lvl1pPr>
           </a:lstStyle>
           <a:p>
-            <a:fld id="{7C06B828-B815-F446-BC49-4CE521295E37}" type="datetimeFigureOut">
-              <a:rPr lang="it-IT" smtClean="0"/>
-              <a:t>01/05/25</a:t>
+            <a:fld id="{1F626C5F-A7D1-A344-8F2D-961E4C5E0D72}" type="datetime1">
+              <a:rPr lang="it-CH" smtClean="0"/>
+              <a:t>01.05.25</a:t>
             </a:fld>
             <a:endParaRPr lang="it-IT"/>
           </a:p>
@@ -4204,6 +4204,7 @@
     <p:sldLayoutId id="2147483658" r:id="rId10"/>
     <p:sldLayoutId id="2147483659" r:id="rId11"/>
   </p:sldLayoutIdLst>
+  <p:hf hdr="0" ftr="0" dt="0"/>
   <p:txStyles>
     <p:titleStyle>
       <a:lvl1pPr algn="l" defTabSz="914400" rtl="0" eaLnBrk="1" latinLnBrk="0" hangingPunct="1">
@@ -5815,6 +5816,35 @@
           </a:p>
         </p:txBody>
       </p:sp>
+      <p:sp>
+        <p:nvSpPr>
+          <p:cNvPr id="4" name="Segnaposto numero diapositiva 3">
+            <a:extLst>
+              <a:ext uri="{FF2B5EF4-FFF2-40B4-BE49-F238E27FC236}">
+                <a16:creationId xmlns:a16="http://schemas.microsoft.com/office/drawing/2014/main" id="{AEBA184D-62E3-A862-D96A-94069B206AE6}"/>
+              </a:ext>
+            </a:extLst>
+          </p:cNvPr>
+          <p:cNvSpPr>
+            <a:spLocks noGrp="1"/>
+          </p:cNvSpPr>
+          <p:nvPr>
+            <p:ph type="sldNum" sz="quarter" idx="12"/>
+          </p:nvPr>
+        </p:nvSpPr>
+        <p:spPr/>
+        <p:txBody>
+          <a:bodyPr/>
+          <a:lstStyle/>
+          <a:p>
+            <a:fld id="{DDE33EDC-7B95-0F48-AC5F-7FA810C80076}" type="slidenum">
+              <a:rPr lang="it-IT" smtClean="0"/>
+              <a:t>2</a:t>
+            </a:fld>
+            <a:endParaRPr lang="it-IT"/>
+          </a:p>
+        </p:txBody>
+      </p:sp>
     </p:spTree>
     <p:extLst>
       <p:ext uri="{BB962C8B-B14F-4D97-AF65-F5344CB8AC3E}">
@@ -6352,6 +6382,35 @@
           </a:ln>
         </p:spPr>
       </p:pic>
+      <p:sp>
+        <p:nvSpPr>
+          <p:cNvPr id="3" name="Segnaposto numero diapositiva 2">
+            <a:extLst>
+              <a:ext uri="{FF2B5EF4-FFF2-40B4-BE49-F238E27FC236}">
+                <a16:creationId xmlns:a16="http://schemas.microsoft.com/office/drawing/2014/main" id="{561C3113-A1E7-3AF7-B043-F8E372B9E5DB}"/>
+              </a:ext>
+            </a:extLst>
+          </p:cNvPr>
+          <p:cNvSpPr>
+            <a:spLocks noGrp="1"/>
+          </p:cNvSpPr>
+          <p:nvPr>
+            <p:ph type="sldNum" sz="quarter" idx="12"/>
+          </p:nvPr>
+        </p:nvSpPr>
+        <p:spPr/>
+        <p:txBody>
+          <a:bodyPr/>
+          <a:lstStyle/>
+          <a:p>
+            <a:fld id="{DDE33EDC-7B95-0F48-AC5F-7FA810C80076}" type="slidenum">
+              <a:rPr lang="it-IT" smtClean="0"/>
+              <a:t>3</a:t>
+            </a:fld>
+            <a:endParaRPr lang="it-IT"/>
+          </a:p>
+        </p:txBody>
+      </p:sp>
     </p:spTree>
     <p:extLst>
       <p:ext uri="{BB962C8B-B14F-4D97-AF65-F5344CB8AC3E}">
@@ -7044,6 +7103,35 @@
           </a:p>
         </p:txBody>
       </p:sp>
+      <p:sp>
+        <p:nvSpPr>
+          <p:cNvPr id="3" name="Segnaposto numero diapositiva 2">
+            <a:extLst>
+              <a:ext uri="{FF2B5EF4-FFF2-40B4-BE49-F238E27FC236}">
+                <a16:creationId xmlns:a16="http://schemas.microsoft.com/office/drawing/2014/main" id="{8BE4D52B-9CAC-0E0B-6C40-46C582953D44}"/>
+              </a:ext>
+            </a:extLst>
+          </p:cNvPr>
+          <p:cNvSpPr>
+            <a:spLocks noGrp="1"/>
+          </p:cNvSpPr>
+          <p:nvPr>
+            <p:ph type="sldNum" sz="quarter" idx="12"/>
+          </p:nvPr>
+        </p:nvSpPr>
+        <p:spPr/>
+        <p:txBody>
+          <a:bodyPr/>
+          <a:lstStyle/>
+          <a:p>
+            <a:fld id="{DDE33EDC-7B95-0F48-AC5F-7FA810C80076}" type="slidenum">
+              <a:rPr lang="it-IT" smtClean="0"/>
+              <a:t>4</a:t>
+            </a:fld>
+            <a:endParaRPr lang="it-IT"/>
+          </a:p>
+        </p:txBody>
+      </p:sp>
     </p:spTree>
     <p:extLst>
       <p:ext uri="{BB962C8B-B14F-4D97-AF65-F5344CB8AC3E}">
@@ -7701,6 +7789,35 @@
           </a:ln>
         </p:spPr>
       </p:pic>
+      <p:sp>
+        <p:nvSpPr>
+          <p:cNvPr id="3" name="Segnaposto numero diapositiva 2">
+            <a:extLst>
+              <a:ext uri="{FF2B5EF4-FFF2-40B4-BE49-F238E27FC236}">
+                <a16:creationId xmlns:a16="http://schemas.microsoft.com/office/drawing/2014/main" id="{07E51FC2-8036-52A9-E075-ACD5237A1975}"/>
+              </a:ext>
+            </a:extLst>
+          </p:cNvPr>
+          <p:cNvSpPr>
+            <a:spLocks noGrp="1"/>
+          </p:cNvSpPr>
+          <p:nvPr>
+            <p:ph type="sldNum" sz="quarter" idx="12"/>
+          </p:nvPr>
+        </p:nvSpPr>
+        <p:spPr/>
+        <p:txBody>
+          <a:bodyPr/>
+          <a:lstStyle/>
+          <a:p>
+            <a:fld id="{DDE33EDC-7B95-0F48-AC5F-7FA810C80076}" type="slidenum">
+              <a:rPr lang="it-IT" smtClean="0"/>
+              <a:t>5</a:t>
+            </a:fld>
+            <a:endParaRPr lang="it-IT"/>
+          </a:p>
+        </p:txBody>
+      </p:sp>
     </p:spTree>
     <p:extLst>
       <p:ext uri="{BB962C8B-B14F-4D97-AF65-F5344CB8AC3E}">
@@ -8202,6 +8319,35 @@
           </a:ln>
         </p:spPr>
       </p:pic>
+      <p:sp>
+        <p:nvSpPr>
+          <p:cNvPr id="3" name="Segnaposto numero diapositiva 2">
+            <a:extLst>
+              <a:ext uri="{FF2B5EF4-FFF2-40B4-BE49-F238E27FC236}">
+                <a16:creationId xmlns:a16="http://schemas.microsoft.com/office/drawing/2014/main" id="{ABE8A2DC-62CF-BF99-3AAA-D8D920BF62F1}"/>
+              </a:ext>
+            </a:extLst>
+          </p:cNvPr>
+          <p:cNvSpPr>
+            <a:spLocks noGrp="1"/>
+          </p:cNvSpPr>
+          <p:nvPr>
+            <p:ph type="sldNum" sz="quarter" idx="12"/>
+          </p:nvPr>
+        </p:nvSpPr>
+        <p:spPr/>
+        <p:txBody>
+          <a:bodyPr/>
+          <a:lstStyle/>
+          <a:p>
+            <a:fld id="{DDE33EDC-7B95-0F48-AC5F-7FA810C80076}" type="slidenum">
+              <a:rPr lang="it-IT" smtClean="0"/>
+              <a:t>6</a:t>
+            </a:fld>
+            <a:endParaRPr lang="it-IT"/>
+          </a:p>
+        </p:txBody>
+      </p:sp>
     </p:spTree>
     <p:extLst>
       <p:ext uri="{BB962C8B-B14F-4D97-AF65-F5344CB8AC3E}">
@@ -8703,6 +8849,35 @@
           </a:ln>
         </p:spPr>
       </p:pic>
+      <p:sp>
+        <p:nvSpPr>
+          <p:cNvPr id="3" name="Segnaposto numero diapositiva 2">
+            <a:extLst>
+              <a:ext uri="{FF2B5EF4-FFF2-40B4-BE49-F238E27FC236}">
+                <a16:creationId xmlns:a16="http://schemas.microsoft.com/office/drawing/2014/main" id="{96139849-FB94-2F3E-C64C-E2F6B8DE25FE}"/>
+              </a:ext>
+            </a:extLst>
+          </p:cNvPr>
+          <p:cNvSpPr>
+            <a:spLocks noGrp="1"/>
+          </p:cNvSpPr>
+          <p:nvPr>
+            <p:ph type="sldNum" sz="quarter" idx="12"/>
+          </p:nvPr>
+        </p:nvSpPr>
+        <p:spPr/>
+        <p:txBody>
+          <a:bodyPr/>
+          <a:lstStyle/>
+          <a:p>
+            <a:fld id="{DDE33EDC-7B95-0F48-AC5F-7FA810C80076}" type="slidenum">
+              <a:rPr lang="it-IT" smtClean="0"/>
+              <a:t>7</a:t>
+            </a:fld>
+            <a:endParaRPr lang="it-IT"/>
+          </a:p>
+        </p:txBody>
+      </p:sp>
     </p:spTree>
     <p:extLst>
       <p:ext uri="{BB962C8B-B14F-4D97-AF65-F5344CB8AC3E}">
@@ -9204,6 +9379,35 @@
           </a:ln>
         </p:spPr>
       </p:pic>
+      <p:sp>
+        <p:nvSpPr>
+          <p:cNvPr id="3" name="Segnaposto numero diapositiva 2">
+            <a:extLst>
+              <a:ext uri="{FF2B5EF4-FFF2-40B4-BE49-F238E27FC236}">
+                <a16:creationId xmlns:a16="http://schemas.microsoft.com/office/drawing/2014/main" id="{B277B9F8-9CC0-420D-B53B-56A2307A083B}"/>
+              </a:ext>
+            </a:extLst>
+          </p:cNvPr>
+          <p:cNvSpPr>
+            <a:spLocks noGrp="1"/>
+          </p:cNvSpPr>
+          <p:nvPr>
+            <p:ph type="sldNum" sz="quarter" idx="12"/>
+          </p:nvPr>
+        </p:nvSpPr>
+        <p:spPr/>
+        <p:txBody>
+          <a:bodyPr/>
+          <a:lstStyle/>
+          <a:p>
+            <a:fld id="{DDE33EDC-7B95-0F48-AC5F-7FA810C80076}" type="slidenum">
+              <a:rPr lang="it-IT" smtClean="0"/>
+              <a:t>8</a:t>
+            </a:fld>
+            <a:endParaRPr lang="it-IT"/>
+          </a:p>
+        </p:txBody>
+      </p:sp>
     </p:spTree>
     <p:extLst>
       <p:ext uri="{BB962C8B-B14F-4D97-AF65-F5344CB8AC3E}">

</xml_diff>

<commit_message>
Update book and presentation
</commit_message>
<xml_diff>
--- a/Doc/Project 1 - Final presentation.pptx
+++ b/Doc/Project 1 - Final presentation.pptx
@@ -5,17 +5,19 @@
     <p:sldMasterId id="2147483648" r:id="rId1"/>
   </p:sldMasterIdLst>
   <p:notesMasterIdLst>
-    <p:notesMasterId r:id="rId10"/>
+    <p:notesMasterId r:id="rId12"/>
   </p:notesMasterIdLst>
   <p:sldIdLst>
     <p:sldId id="256" r:id="rId2"/>
     <p:sldId id="257" r:id="rId3"/>
     <p:sldId id="258" r:id="rId4"/>
-    <p:sldId id="259" r:id="rId5"/>
-    <p:sldId id="260" r:id="rId6"/>
-    <p:sldId id="261" r:id="rId7"/>
-    <p:sldId id="262" r:id="rId8"/>
-    <p:sldId id="263" r:id="rId9"/>
+    <p:sldId id="264" r:id="rId5"/>
+    <p:sldId id="259" r:id="rId6"/>
+    <p:sldId id="265" r:id="rId7"/>
+    <p:sldId id="260" r:id="rId8"/>
+    <p:sldId id="261" r:id="rId9"/>
+    <p:sldId id="262" r:id="rId10"/>
+    <p:sldId id="263" r:id="rId11"/>
   </p:sldIdLst>
   <p:sldSz cx="12192000" cy="6858000"/>
   <p:notesSz cx="6858000" cy="9144000"/>
@@ -558,6 +560,114 @@
 </p:notes>
 </file>
 
+<file path=ppt/notesSlides/notesSlide10.xml><?xml version="1.0" encoding="utf-8"?>
+<p:notes xmlns:a="http://schemas.openxmlformats.org/drawingml/2006/main" xmlns:r="http://schemas.openxmlformats.org/officeDocument/2006/relationships" xmlns:p="http://schemas.openxmlformats.org/presentationml/2006/main">
+  <p:cSld>
+    <p:spTree>
+      <p:nvGrpSpPr>
+        <p:cNvPr id="1" name="">
+          <a:extLst>
+            <a:ext uri="{FF2B5EF4-FFF2-40B4-BE49-F238E27FC236}">
+              <a16:creationId xmlns:a16="http://schemas.microsoft.com/office/drawing/2014/main" id="{17C5C626-6BA0-256F-2A65-D1139DC50086}"/>
+            </a:ext>
+          </a:extLst>
+        </p:cNvPr>
+        <p:cNvGrpSpPr/>
+        <p:nvPr/>
+      </p:nvGrpSpPr>
+      <p:grpSpPr>
+        <a:xfrm>
+          <a:off x="0" y="0"/>
+          <a:ext cx="0" cy="0"/>
+          <a:chOff x="0" y="0"/>
+          <a:chExt cx="0" cy="0"/>
+        </a:xfrm>
+      </p:grpSpPr>
+      <p:sp>
+        <p:nvSpPr>
+          <p:cNvPr id="2" name="Segnaposto immagine diapositiva 1">
+            <a:extLst>
+              <a:ext uri="{FF2B5EF4-FFF2-40B4-BE49-F238E27FC236}">
+                <a16:creationId xmlns:a16="http://schemas.microsoft.com/office/drawing/2014/main" id="{6C08B941-91F6-1DB8-C359-BDDA5E1B3C85}"/>
+              </a:ext>
+            </a:extLst>
+          </p:cNvPr>
+          <p:cNvSpPr>
+            <a:spLocks noGrp="1" noRot="1" noChangeAspect="1"/>
+          </p:cNvSpPr>
+          <p:nvPr>
+            <p:ph type="sldImg"/>
+          </p:nvPr>
+        </p:nvSpPr>
+        <p:spPr/>
+      </p:sp>
+      <p:sp>
+        <p:nvSpPr>
+          <p:cNvPr id="3" name="Segnaposto note 2">
+            <a:extLst>
+              <a:ext uri="{FF2B5EF4-FFF2-40B4-BE49-F238E27FC236}">
+                <a16:creationId xmlns:a16="http://schemas.microsoft.com/office/drawing/2014/main" id="{7CF9DE87-C6C0-9D34-5FB7-2BB031C9ECA2}"/>
+              </a:ext>
+            </a:extLst>
+          </p:cNvPr>
+          <p:cNvSpPr>
+            <a:spLocks noGrp="1"/>
+          </p:cNvSpPr>
+          <p:nvPr>
+            <p:ph type="body" idx="1"/>
+          </p:nvPr>
+        </p:nvSpPr>
+        <p:spPr/>
+        <p:txBody>
+          <a:bodyPr/>
+          <a:lstStyle/>
+          <a:p>
+            <a:endParaRPr lang="it-IT" dirty="0"/>
+          </a:p>
+        </p:txBody>
+      </p:sp>
+      <p:sp>
+        <p:nvSpPr>
+          <p:cNvPr id="4" name="Segnaposto numero diapositiva 3">
+            <a:extLst>
+              <a:ext uri="{FF2B5EF4-FFF2-40B4-BE49-F238E27FC236}">
+                <a16:creationId xmlns:a16="http://schemas.microsoft.com/office/drawing/2014/main" id="{38EE8A60-6E00-8658-7502-D595D628B369}"/>
+              </a:ext>
+            </a:extLst>
+          </p:cNvPr>
+          <p:cNvSpPr>
+            <a:spLocks noGrp="1"/>
+          </p:cNvSpPr>
+          <p:nvPr>
+            <p:ph type="sldNum" sz="quarter" idx="5"/>
+          </p:nvPr>
+        </p:nvSpPr>
+        <p:spPr/>
+        <p:txBody>
+          <a:bodyPr/>
+          <a:lstStyle/>
+          <a:p>
+            <a:fld id="{87697A50-4E5B-2246-A729-7254E6D3556D}" type="slidenum">
+              <a:rPr lang="it-IT" smtClean="0"/>
+              <a:t>10</a:t>
+            </a:fld>
+            <a:endParaRPr lang="it-IT"/>
+          </a:p>
+        </p:txBody>
+      </p:sp>
+    </p:spTree>
+    <p:extLst>
+      <p:ext uri="{BB962C8B-B14F-4D97-AF65-F5344CB8AC3E}">
+        <p14:creationId xmlns:p14="http://schemas.microsoft.com/office/powerpoint/2010/main" val="924608642"/>
+      </p:ext>
+    </p:extLst>
+  </p:cSld>
+  <p:clrMapOvr>
+    <a:masterClrMapping/>
+  </p:clrMapOvr>
+</p:notes>
+</file>
+
 <file path=ppt/notesSlides/notesSlide2.xml><?xml version="1.0" encoding="utf-8"?>
 <p:notes xmlns:a="http://schemas.openxmlformats.org/drawingml/2006/main" xmlns:r="http://schemas.openxmlformats.org/officeDocument/2006/relationships" xmlns:p="http://schemas.openxmlformats.org/presentationml/2006/main">
   <p:cSld>
@@ -758,6 +868,114 @@
         <p:cNvPr id="1" name="">
           <a:extLst>
             <a:ext uri="{FF2B5EF4-FFF2-40B4-BE49-F238E27FC236}">
+              <a16:creationId xmlns:a16="http://schemas.microsoft.com/office/drawing/2014/main" id="{A8A98877-B7E1-7348-93EA-BE263DF1139F}"/>
+            </a:ext>
+          </a:extLst>
+        </p:cNvPr>
+        <p:cNvGrpSpPr/>
+        <p:nvPr/>
+      </p:nvGrpSpPr>
+      <p:grpSpPr>
+        <a:xfrm>
+          <a:off x="0" y="0"/>
+          <a:ext cx="0" cy="0"/>
+          <a:chOff x="0" y="0"/>
+          <a:chExt cx="0" cy="0"/>
+        </a:xfrm>
+      </p:grpSpPr>
+      <p:sp>
+        <p:nvSpPr>
+          <p:cNvPr id="2" name="Segnaposto immagine diapositiva 1">
+            <a:extLst>
+              <a:ext uri="{FF2B5EF4-FFF2-40B4-BE49-F238E27FC236}">
+                <a16:creationId xmlns:a16="http://schemas.microsoft.com/office/drawing/2014/main" id="{10CDBE37-E277-0535-36FF-9F676631CC81}"/>
+              </a:ext>
+            </a:extLst>
+          </p:cNvPr>
+          <p:cNvSpPr>
+            <a:spLocks noGrp="1" noRot="1" noChangeAspect="1"/>
+          </p:cNvSpPr>
+          <p:nvPr>
+            <p:ph type="sldImg"/>
+          </p:nvPr>
+        </p:nvSpPr>
+        <p:spPr/>
+      </p:sp>
+      <p:sp>
+        <p:nvSpPr>
+          <p:cNvPr id="3" name="Segnaposto note 2">
+            <a:extLst>
+              <a:ext uri="{FF2B5EF4-FFF2-40B4-BE49-F238E27FC236}">
+                <a16:creationId xmlns:a16="http://schemas.microsoft.com/office/drawing/2014/main" id="{15A7B0F2-F230-AD37-AE9E-C0D6645A9F12}"/>
+              </a:ext>
+            </a:extLst>
+          </p:cNvPr>
+          <p:cNvSpPr>
+            <a:spLocks noGrp="1"/>
+          </p:cNvSpPr>
+          <p:nvPr>
+            <p:ph type="body" idx="1"/>
+          </p:nvPr>
+        </p:nvSpPr>
+        <p:spPr/>
+        <p:txBody>
+          <a:bodyPr/>
+          <a:lstStyle/>
+          <a:p>
+            <a:endParaRPr lang="it-IT" dirty="0"/>
+          </a:p>
+        </p:txBody>
+      </p:sp>
+      <p:sp>
+        <p:nvSpPr>
+          <p:cNvPr id="4" name="Segnaposto numero diapositiva 3">
+            <a:extLst>
+              <a:ext uri="{FF2B5EF4-FFF2-40B4-BE49-F238E27FC236}">
+                <a16:creationId xmlns:a16="http://schemas.microsoft.com/office/drawing/2014/main" id="{CDB92D32-1339-5F49-23ED-71461082F12D}"/>
+              </a:ext>
+            </a:extLst>
+          </p:cNvPr>
+          <p:cNvSpPr>
+            <a:spLocks noGrp="1"/>
+          </p:cNvSpPr>
+          <p:nvPr>
+            <p:ph type="sldNum" sz="quarter" idx="5"/>
+          </p:nvPr>
+        </p:nvSpPr>
+        <p:spPr/>
+        <p:txBody>
+          <a:bodyPr/>
+          <a:lstStyle/>
+          <a:p>
+            <a:fld id="{87697A50-4E5B-2246-A729-7254E6D3556D}" type="slidenum">
+              <a:rPr lang="it-IT" smtClean="0"/>
+              <a:t>4</a:t>
+            </a:fld>
+            <a:endParaRPr lang="it-IT"/>
+          </a:p>
+        </p:txBody>
+      </p:sp>
+    </p:spTree>
+    <p:extLst>
+      <p:ext uri="{BB962C8B-B14F-4D97-AF65-F5344CB8AC3E}">
+        <p14:creationId xmlns:p14="http://schemas.microsoft.com/office/powerpoint/2010/main" val="1561505901"/>
+      </p:ext>
+    </p:extLst>
+  </p:cSld>
+  <p:clrMapOvr>
+    <a:masterClrMapping/>
+  </p:clrMapOvr>
+</p:notes>
+</file>
+
+<file path=ppt/notesSlides/notesSlide5.xml><?xml version="1.0" encoding="utf-8"?>
+<p:notes xmlns:a="http://schemas.openxmlformats.org/drawingml/2006/main" xmlns:r="http://schemas.openxmlformats.org/officeDocument/2006/relationships" xmlns:p="http://schemas.openxmlformats.org/presentationml/2006/main">
+  <p:cSld>
+    <p:spTree>
+      <p:nvGrpSpPr>
+        <p:cNvPr id="1" name="">
+          <a:extLst>
+            <a:ext uri="{FF2B5EF4-FFF2-40B4-BE49-F238E27FC236}">
               <a16:creationId xmlns:a16="http://schemas.microsoft.com/office/drawing/2014/main" id="{56CD5145-3BA9-7B72-7290-01AB1930A703}"/>
             </a:ext>
           </a:extLst>
@@ -839,7 +1057,7 @@
           <a:p>
             <a:fld id="{87697A50-4E5B-2246-A729-7254E6D3556D}" type="slidenum">
               <a:rPr lang="it-IT" smtClean="0"/>
-              <a:t>4</a:t>
+              <a:t>5</a:t>
             </a:fld>
             <a:endParaRPr lang="it-IT"/>
           </a:p>
@@ -858,7 +1076,115 @@
 </p:notes>
 </file>
 
-<file path=ppt/notesSlides/notesSlide5.xml><?xml version="1.0" encoding="utf-8"?>
+<file path=ppt/notesSlides/notesSlide6.xml><?xml version="1.0" encoding="utf-8"?>
+<p:notes xmlns:a="http://schemas.openxmlformats.org/drawingml/2006/main" xmlns:r="http://schemas.openxmlformats.org/officeDocument/2006/relationships" xmlns:p="http://schemas.openxmlformats.org/presentationml/2006/main">
+  <p:cSld>
+    <p:spTree>
+      <p:nvGrpSpPr>
+        <p:cNvPr id="1" name="">
+          <a:extLst>
+            <a:ext uri="{FF2B5EF4-FFF2-40B4-BE49-F238E27FC236}">
+              <a16:creationId xmlns:a16="http://schemas.microsoft.com/office/drawing/2014/main" id="{785D4FCF-4B49-D702-48A7-ECF13D4D48DA}"/>
+            </a:ext>
+          </a:extLst>
+        </p:cNvPr>
+        <p:cNvGrpSpPr/>
+        <p:nvPr/>
+      </p:nvGrpSpPr>
+      <p:grpSpPr>
+        <a:xfrm>
+          <a:off x="0" y="0"/>
+          <a:ext cx="0" cy="0"/>
+          <a:chOff x="0" y="0"/>
+          <a:chExt cx="0" cy="0"/>
+        </a:xfrm>
+      </p:grpSpPr>
+      <p:sp>
+        <p:nvSpPr>
+          <p:cNvPr id="2" name="Segnaposto immagine diapositiva 1">
+            <a:extLst>
+              <a:ext uri="{FF2B5EF4-FFF2-40B4-BE49-F238E27FC236}">
+                <a16:creationId xmlns:a16="http://schemas.microsoft.com/office/drawing/2014/main" id="{7CA329BC-04BE-54F6-93D4-CB992D181B52}"/>
+              </a:ext>
+            </a:extLst>
+          </p:cNvPr>
+          <p:cNvSpPr>
+            <a:spLocks noGrp="1" noRot="1" noChangeAspect="1"/>
+          </p:cNvSpPr>
+          <p:nvPr>
+            <p:ph type="sldImg"/>
+          </p:nvPr>
+        </p:nvSpPr>
+        <p:spPr/>
+      </p:sp>
+      <p:sp>
+        <p:nvSpPr>
+          <p:cNvPr id="3" name="Segnaposto note 2">
+            <a:extLst>
+              <a:ext uri="{FF2B5EF4-FFF2-40B4-BE49-F238E27FC236}">
+                <a16:creationId xmlns:a16="http://schemas.microsoft.com/office/drawing/2014/main" id="{EE38EDDC-522D-0A3B-408E-2C7CD2E35300}"/>
+              </a:ext>
+            </a:extLst>
+          </p:cNvPr>
+          <p:cNvSpPr>
+            <a:spLocks noGrp="1"/>
+          </p:cNvSpPr>
+          <p:nvPr>
+            <p:ph type="body" idx="1"/>
+          </p:nvPr>
+        </p:nvSpPr>
+        <p:spPr/>
+        <p:txBody>
+          <a:bodyPr/>
+          <a:lstStyle/>
+          <a:p>
+            <a:endParaRPr lang="it-IT" dirty="0"/>
+          </a:p>
+        </p:txBody>
+      </p:sp>
+      <p:sp>
+        <p:nvSpPr>
+          <p:cNvPr id="4" name="Segnaposto numero diapositiva 3">
+            <a:extLst>
+              <a:ext uri="{FF2B5EF4-FFF2-40B4-BE49-F238E27FC236}">
+                <a16:creationId xmlns:a16="http://schemas.microsoft.com/office/drawing/2014/main" id="{E8BBA612-C475-D0C9-ADC8-34E9EB31DE38}"/>
+              </a:ext>
+            </a:extLst>
+          </p:cNvPr>
+          <p:cNvSpPr>
+            <a:spLocks noGrp="1"/>
+          </p:cNvSpPr>
+          <p:nvPr>
+            <p:ph type="sldNum" sz="quarter" idx="5"/>
+          </p:nvPr>
+        </p:nvSpPr>
+        <p:spPr/>
+        <p:txBody>
+          <a:bodyPr/>
+          <a:lstStyle/>
+          <a:p>
+            <a:fld id="{87697A50-4E5B-2246-A729-7254E6D3556D}" type="slidenum">
+              <a:rPr lang="it-IT" smtClean="0"/>
+              <a:t>6</a:t>
+            </a:fld>
+            <a:endParaRPr lang="it-IT"/>
+          </a:p>
+        </p:txBody>
+      </p:sp>
+    </p:spTree>
+    <p:extLst>
+      <p:ext uri="{BB962C8B-B14F-4D97-AF65-F5344CB8AC3E}">
+        <p14:creationId xmlns:p14="http://schemas.microsoft.com/office/powerpoint/2010/main" val="4240571502"/>
+      </p:ext>
+    </p:extLst>
+  </p:cSld>
+  <p:clrMapOvr>
+    <a:masterClrMapping/>
+  </p:clrMapOvr>
+</p:notes>
+</file>
+
+<file path=ppt/notesSlides/notesSlide7.xml><?xml version="1.0" encoding="utf-8"?>
 <p:notes xmlns:a="http://schemas.openxmlformats.org/drawingml/2006/main" xmlns:r="http://schemas.openxmlformats.org/officeDocument/2006/relationships" xmlns:p="http://schemas.openxmlformats.org/presentationml/2006/main">
   <p:cSld>
     <p:spTree>
@@ -947,7 +1273,7 @@
           <a:p>
             <a:fld id="{87697A50-4E5B-2246-A729-7254E6D3556D}" type="slidenum">
               <a:rPr lang="it-IT" smtClean="0"/>
-              <a:t>5</a:t>
+              <a:t>7</a:t>
             </a:fld>
             <a:endParaRPr lang="it-IT"/>
           </a:p>
@@ -966,7 +1292,7 @@
 </p:notes>
 </file>
 
-<file path=ppt/notesSlides/notesSlide6.xml><?xml version="1.0" encoding="utf-8"?>
+<file path=ppt/notesSlides/notesSlide8.xml><?xml version="1.0" encoding="utf-8"?>
 <p:notes xmlns:a="http://schemas.openxmlformats.org/drawingml/2006/main" xmlns:r="http://schemas.openxmlformats.org/officeDocument/2006/relationships" xmlns:p="http://schemas.openxmlformats.org/presentationml/2006/main">
   <p:cSld>
     <p:spTree>
@@ -1055,7 +1381,7 @@
           <a:p>
             <a:fld id="{87697A50-4E5B-2246-A729-7254E6D3556D}" type="slidenum">
               <a:rPr lang="it-IT" smtClean="0"/>
-              <a:t>6</a:t>
+              <a:t>8</a:t>
             </a:fld>
             <a:endParaRPr lang="it-IT"/>
           </a:p>
@@ -1074,7 +1400,7 @@
 </p:notes>
 </file>
 
-<file path=ppt/notesSlides/notesSlide7.xml><?xml version="1.0" encoding="utf-8"?>
+<file path=ppt/notesSlides/notesSlide9.xml><?xml version="1.0" encoding="utf-8"?>
 <p:notes xmlns:a="http://schemas.openxmlformats.org/drawingml/2006/main" xmlns:r="http://schemas.openxmlformats.org/officeDocument/2006/relationships" xmlns:p="http://schemas.openxmlformats.org/presentationml/2006/main">
   <p:cSld>
     <p:spTree>
@@ -1163,7 +1489,7 @@
           <a:p>
             <a:fld id="{87697A50-4E5B-2246-A729-7254E6D3556D}" type="slidenum">
               <a:rPr lang="it-IT" smtClean="0"/>
-              <a:t>7</a:t>
+              <a:t>9</a:t>
             </a:fld>
             <a:endParaRPr lang="it-IT"/>
           </a:p>
@@ -1173,114 +1499,6 @@
     <p:extLst>
       <p:ext uri="{BB962C8B-B14F-4D97-AF65-F5344CB8AC3E}">
         <p14:creationId xmlns:p14="http://schemas.microsoft.com/office/powerpoint/2010/main" val="380795264"/>
-      </p:ext>
-    </p:extLst>
-  </p:cSld>
-  <p:clrMapOvr>
-    <a:masterClrMapping/>
-  </p:clrMapOvr>
-</p:notes>
-</file>
-
-<file path=ppt/notesSlides/notesSlide8.xml><?xml version="1.0" encoding="utf-8"?>
-<p:notes xmlns:a="http://schemas.openxmlformats.org/drawingml/2006/main" xmlns:r="http://schemas.openxmlformats.org/officeDocument/2006/relationships" xmlns:p="http://schemas.openxmlformats.org/presentationml/2006/main">
-  <p:cSld>
-    <p:spTree>
-      <p:nvGrpSpPr>
-        <p:cNvPr id="1" name="">
-          <a:extLst>
-            <a:ext uri="{FF2B5EF4-FFF2-40B4-BE49-F238E27FC236}">
-              <a16:creationId xmlns:a16="http://schemas.microsoft.com/office/drawing/2014/main" id="{17C5C626-6BA0-256F-2A65-D1139DC50086}"/>
-            </a:ext>
-          </a:extLst>
-        </p:cNvPr>
-        <p:cNvGrpSpPr/>
-        <p:nvPr/>
-      </p:nvGrpSpPr>
-      <p:grpSpPr>
-        <a:xfrm>
-          <a:off x="0" y="0"/>
-          <a:ext cx="0" cy="0"/>
-          <a:chOff x="0" y="0"/>
-          <a:chExt cx="0" cy="0"/>
-        </a:xfrm>
-      </p:grpSpPr>
-      <p:sp>
-        <p:nvSpPr>
-          <p:cNvPr id="2" name="Segnaposto immagine diapositiva 1">
-            <a:extLst>
-              <a:ext uri="{FF2B5EF4-FFF2-40B4-BE49-F238E27FC236}">
-                <a16:creationId xmlns:a16="http://schemas.microsoft.com/office/drawing/2014/main" id="{6C08B941-91F6-1DB8-C359-BDDA5E1B3C85}"/>
-              </a:ext>
-            </a:extLst>
-          </p:cNvPr>
-          <p:cNvSpPr>
-            <a:spLocks noGrp="1" noRot="1" noChangeAspect="1"/>
-          </p:cNvSpPr>
-          <p:nvPr>
-            <p:ph type="sldImg"/>
-          </p:nvPr>
-        </p:nvSpPr>
-        <p:spPr/>
-      </p:sp>
-      <p:sp>
-        <p:nvSpPr>
-          <p:cNvPr id="3" name="Segnaposto note 2">
-            <a:extLst>
-              <a:ext uri="{FF2B5EF4-FFF2-40B4-BE49-F238E27FC236}">
-                <a16:creationId xmlns:a16="http://schemas.microsoft.com/office/drawing/2014/main" id="{7CF9DE87-C6C0-9D34-5FB7-2BB031C9ECA2}"/>
-              </a:ext>
-            </a:extLst>
-          </p:cNvPr>
-          <p:cNvSpPr>
-            <a:spLocks noGrp="1"/>
-          </p:cNvSpPr>
-          <p:nvPr>
-            <p:ph type="body" idx="1"/>
-          </p:nvPr>
-        </p:nvSpPr>
-        <p:spPr/>
-        <p:txBody>
-          <a:bodyPr/>
-          <a:lstStyle/>
-          <a:p>
-            <a:endParaRPr lang="it-IT" dirty="0"/>
-          </a:p>
-        </p:txBody>
-      </p:sp>
-      <p:sp>
-        <p:nvSpPr>
-          <p:cNvPr id="4" name="Segnaposto numero diapositiva 3">
-            <a:extLst>
-              <a:ext uri="{FF2B5EF4-FFF2-40B4-BE49-F238E27FC236}">
-                <a16:creationId xmlns:a16="http://schemas.microsoft.com/office/drawing/2014/main" id="{38EE8A60-6E00-8658-7502-D595D628B369}"/>
-              </a:ext>
-            </a:extLst>
-          </p:cNvPr>
-          <p:cNvSpPr>
-            <a:spLocks noGrp="1"/>
-          </p:cNvSpPr>
-          <p:nvPr>
-            <p:ph type="sldNum" sz="quarter" idx="5"/>
-          </p:nvPr>
-        </p:nvSpPr>
-        <p:spPr/>
-        <p:txBody>
-          <a:bodyPr/>
-          <a:lstStyle/>
-          <a:p>
-            <a:fld id="{87697A50-4E5B-2246-A729-7254E6D3556D}" type="slidenum">
-              <a:rPr lang="it-IT" smtClean="0"/>
-              <a:t>8</a:t>
-            </a:fld>
-            <a:endParaRPr lang="it-IT"/>
-          </a:p>
-        </p:txBody>
-      </p:sp>
-    </p:spTree>
-    <p:extLst>
-      <p:ext uri="{BB962C8B-B14F-4D97-AF65-F5344CB8AC3E}">
-        <p14:creationId xmlns:p14="http://schemas.microsoft.com/office/powerpoint/2010/main" val="924608642"/>
       </p:ext>
     </p:extLst>
   </p:cSld>
@@ -5283,6 +5501,536 @@
 </p:sld>
 </file>
 
+<file path=ppt/slides/slide10.xml><?xml version="1.0" encoding="utf-8"?>
+<p:sld xmlns:a="http://schemas.openxmlformats.org/drawingml/2006/main" xmlns:r="http://schemas.openxmlformats.org/officeDocument/2006/relationships" xmlns:p="http://schemas.openxmlformats.org/presentationml/2006/main">
+  <p:cSld>
+    <p:bg>
+      <p:bgPr>
+        <a:solidFill>
+          <a:schemeClr val="bg1"/>
+        </a:solidFill>
+        <a:effectLst/>
+      </p:bgPr>
+    </p:bg>
+    <p:spTree>
+      <p:nvGrpSpPr>
+        <p:cNvPr id="1" name="">
+          <a:extLst>
+            <a:ext uri="{FF2B5EF4-FFF2-40B4-BE49-F238E27FC236}">
+              <a16:creationId xmlns:a16="http://schemas.microsoft.com/office/drawing/2014/main" id="{5F912492-67B8-2101-C0C8-C5F31E1241D8}"/>
+            </a:ext>
+          </a:extLst>
+        </p:cNvPr>
+        <p:cNvGrpSpPr/>
+        <p:nvPr/>
+      </p:nvGrpSpPr>
+      <p:grpSpPr>
+        <a:xfrm>
+          <a:off x="0" y="0"/>
+          <a:ext cx="0" cy="0"/>
+          <a:chOff x="0" y="0"/>
+          <a:chExt cx="0" cy="0"/>
+        </a:xfrm>
+      </p:grpSpPr>
+      <p:sp useBgFill="1">
+        <p:nvSpPr>
+          <p:cNvPr id="8" name="Rectangle 7">
+            <a:extLst>
+              <a:ext uri="{FF2B5EF4-FFF2-40B4-BE49-F238E27FC236}">
+                <a16:creationId xmlns:a16="http://schemas.microsoft.com/office/drawing/2014/main" id="{2D71D30C-6832-0873-CC41-C3B83B5A838D}"/>
+              </a:ext>
+              <a:ext uri="{C183D7F6-B498-43B3-948B-1728B52AA6E4}">
+                <adec:decorative xmlns:adec="http://schemas.microsoft.com/office/drawing/2017/decorative" val="1"/>
+              </a:ext>
+            </a:extLst>
+          </p:cNvPr>
+          <p:cNvSpPr>
+            <a:spLocks noGrp="1" noRot="1" noChangeAspect="1" noMove="1" noResize="1" noEditPoints="1" noAdjustHandles="1" noChangeArrowheads="1" noChangeShapeType="1" noTextEdit="1"/>
+          </p:cNvSpPr>
+          <p:nvPr>
+            <p:extLst>
+              <p:ext uri="{386F3935-93C4-4BCD-93E2-E3B085C9AB24}">
+                <p16:designElem xmlns:p16="http://schemas.microsoft.com/office/powerpoint/2015/main" val="1"/>
+              </p:ext>
+            </p:extLst>
+          </p:nvPr>
+        </p:nvSpPr>
+        <p:spPr>
+          <a:xfrm>
+            <a:off x="0" y="0"/>
+            <a:ext cx="12192000" cy="6858000"/>
+          </a:xfrm>
+          <a:prstGeom prst="rect">
+            <a:avLst/>
+          </a:prstGeom>
+          <a:ln w="12700" cap="flat" cmpd="sng" algn="ctr">
+            <a:noFill/>
+            <a:prstDash val="solid"/>
+            <a:miter lim="800000"/>
+          </a:ln>
+          <a:effectLst/>
+          <a:extLst>
+            <a:ext uri="{91240B29-F687-4F45-9708-019B960494DF}">
+              <a14:hiddenLine xmlns:a14="http://schemas.microsoft.com/office/drawing/2010/main" w="12700" cap="flat" cmpd="sng" algn="ctr">
+                <a:solidFill>
+                  <a:schemeClr val="accent1">
+                    <a:shade val="50000"/>
+                  </a:schemeClr>
+                </a:solidFill>
+                <a:prstDash val="solid"/>
+                <a:miter lim="800000"/>
+              </a14:hiddenLine>
+            </a:ext>
+          </a:extLst>
+        </p:spPr>
+        <p:style>
+          <a:lnRef idx="2">
+            <a:schemeClr val="accent1">
+              <a:shade val="50000"/>
+            </a:schemeClr>
+          </a:lnRef>
+          <a:fillRef idx="1">
+            <a:schemeClr val="accent1"/>
+          </a:fillRef>
+          <a:effectRef idx="0">
+            <a:schemeClr val="accent1"/>
+          </a:effectRef>
+          <a:fontRef idx="minor">
+            <a:schemeClr val="lt1"/>
+          </a:fontRef>
+        </p:style>
+        <p:txBody>
+          <a:bodyPr rtlCol="0" anchor="ctr"/>
+          <a:lstStyle/>
+          <a:p>
+            <a:pPr algn="ctr"/>
+            <a:endParaRPr lang="en-US"/>
+          </a:p>
+        </p:txBody>
+      </p:sp>
+      <p:sp>
+        <p:nvSpPr>
+          <p:cNvPr id="10" name="Rectangle 9">
+            <a:extLst>
+              <a:ext uri="{FF2B5EF4-FFF2-40B4-BE49-F238E27FC236}">
+                <a16:creationId xmlns:a16="http://schemas.microsoft.com/office/drawing/2014/main" id="{780B01E4-9DCA-6905-724D-669D36ADB123}"/>
+              </a:ext>
+              <a:ext uri="{C183D7F6-B498-43B3-948B-1728B52AA6E4}">
+                <adec:decorative xmlns:adec="http://schemas.microsoft.com/office/drawing/2017/decorative" val="1"/>
+              </a:ext>
+            </a:extLst>
+          </p:cNvPr>
+          <p:cNvSpPr>
+            <a:spLocks noGrp="1" noRot="1" noChangeAspect="1" noMove="1" noResize="1" noEditPoints="1" noAdjustHandles="1" noChangeArrowheads="1" noChangeShapeType="1" noTextEdit="1"/>
+          </p:cNvSpPr>
+          <p:nvPr>
+            <p:extLst>
+              <p:ext uri="{386F3935-93C4-4BCD-93E2-E3B085C9AB24}">
+                <p16:designElem xmlns:p16="http://schemas.microsoft.com/office/powerpoint/2015/main" val="1"/>
+              </p:ext>
+            </p:extLst>
+          </p:nvPr>
+        </p:nvSpPr>
+        <p:spPr>
+          <a:xfrm flipH="1">
+            <a:off x="-1" y="-1"/>
+            <a:ext cx="12191998" cy="1590742"/>
+          </a:xfrm>
+          <a:prstGeom prst="rect">
+            <a:avLst/>
+          </a:prstGeom>
+          <a:gradFill>
+            <a:gsLst>
+              <a:gs pos="0">
+                <a:srgbClr val="000000"/>
+              </a:gs>
+              <a:gs pos="100000">
+                <a:schemeClr val="accent1">
+                  <a:lumMod val="75000"/>
+                </a:schemeClr>
+              </a:gs>
+            </a:gsLst>
+            <a:lin ang="8400000" scaled="0"/>
+          </a:gradFill>
+          <a:ln>
+            <a:noFill/>
+          </a:ln>
+        </p:spPr>
+        <p:style>
+          <a:lnRef idx="2">
+            <a:schemeClr val="accent1">
+              <a:shade val="50000"/>
+            </a:schemeClr>
+          </a:lnRef>
+          <a:fillRef idx="1">
+            <a:schemeClr val="accent1"/>
+          </a:fillRef>
+          <a:effectRef idx="0">
+            <a:schemeClr val="accent1"/>
+          </a:effectRef>
+          <a:fontRef idx="minor">
+            <a:schemeClr val="lt1"/>
+          </a:fontRef>
+        </p:style>
+        <p:txBody>
+          <a:bodyPr rtlCol="0" anchor="ctr"/>
+          <a:lstStyle/>
+          <a:p>
+            <a:pPr algn="ctr"/>
+            <a:endParaRPr lang="en-US"/>
+          </a:p>
+        </p:txBody>
+      </p:sp>
+      <p:sp>
+        <p:nvSpPr>
+          <p:cNvPr id="12" name="Rectangle 11">
+            <a:extLst>
+              <a:ext uri="{FF2B5EF4-FFF2-40B4-BE49-F238E27FC236}">
+                <a16:creationId xmlns:a16="http://schemas.microsoft.com/office/drawing/2014/main" id="{DCB1AF8C-BDD9-7009-34DA-78F1517D1110}"/>
+              </a:ext>
+              <a:ext uri="{C183D7F6-B498-43B3-948B-1728B52AA6E4}">
+                <adec:decorative xmlns:adec="http://schemas.microsoft.com/office/drawing/2017/decorative" val="1"/>
+              </a:ext>
+            </a:extLst>
+          </p:cNvPr>
+          <p:cNvSpPr>
+            <a:spLocks noGrp="1" noRot="1" noChangeAspect="1" noMove="1" noResize="1" noEditPoints="1" noAdjustHandles="1" noChangeArrowheads="1" noChangeShapeType="1" noTextEdit="1"/>
+          </p:cNvSpPr>
+          <p:nvPr>
+            <p:extLst>
+              <p:ext uri="{386F3935-93C4-4BCD-93E2-E3B085C9AB24}">
+                <p16:designElem xmlns:p16="http://schemas.microsoft.com/office/powerpoint/2015/main" val="1"/>
+              </p:ext>
+            </p:extLst>
+          </p:nvPr>
+        </p:nvSpPr>
+        <p:spPr>
+          <a:xfrm rot="10800000" flipH="1">
+            <a:off x="-3" y="0"/>
+            <a:ext cx="8115306" cy="1590742"/>
+          </a:xfrm>
+          <a:prstGeom prst="rect">
+            <a:avLst/>
+          </a:prstGeom>
+          <a:gradFill>
+            <a:gsLst>
+              <a:gs pos="20000">
+                <a:schemeClr val="accent1">
+                  <a:alpha val="0"/>
+                </a:schemeClr>
+              </a:gs>
+              <a:gs pos="100000">
+                <a:schemeClr val="accent1">
+                  <a:lumMod val="50000"/>
+                  <a:alpha val="55000"/>
+                </a:schemeClr>
+              </a:gs>
+            </a:gsLst>
+            <a:lin ang="13800000" scaled="0"/>
+          </a:gradFill>
+          <a:ln>
+            <a:noFill/>
+          </a:ln>
+        </p:spPr>
+        <p:style>
+          <a:lnRef idx="2">
+            <a:schemeClr val="accent1">
+              <a:shade val="50000"/>
+            </a:schemeClr>
+          </a:lnRef>
+          <a:fillRef idx="1">
+            <a:schemeClr val="accent1"/>
+          </a:fillRef>
+          <a:effectRef idx="0">
+            <a:schemeClr val="accent1"/>
+          </a:effectRef>
+          <a:fontRef idx="minor">
+            <a:schemeClr val="lt1"/>
+          </a:fontRef>
+        </p:style>
+        <p:txBody>
+          <a:bodyPr rtlCol="0" anchor="ctr"/>
+          <a:lstStyle/>
+          <a:p>
+            <a:pPr algn="ctr"/>
+            <a:endParaRPr lang="en-US"/>
+          </a:p>
+        </p:txBody>
+      </p:sp>
+      <p:sp>
+        <p:nvSpPr>
+          <p:cNvPr id="14" name="Rectangle 13">
+            <a:extLst>
+              <a:ext uri="{FF2B5EF4-FFF2-40B4-BE49-F238E27FC236}">
+                <a16:creationId xmlns:a16="http://schemas.microsoft.com/office/drawing/2014/main" id="{D5363DD8-730B-C9FB-D843-17996D4BC8A7}"/>
+              </a:ext>
+              <a:ext uri="{C183D7F6-B498-43B3-948B-1728B52AA6E4}">
+                <adec:decorative xmlns:adec="http://schemas.microsoft.com/office/drawing/2017/decorative" val="1"/>
+              </a:ext>
+            </a:extLst>
+          </p:cNvPr>
+          <p:cNvSpPr>
+            <a:spLocks noGrp="1" noRot="1" noChangeAspect="1" noMove="1" noResize="1" noEditPoints="1" noAdjustHandles="1" noChangeArrowheads="1" noChangeShapeType="1" noTextEdit="1"/>
+          </p:cNvSpPr>
+          <p:nvPr>
+            <p:extLst>
+              <p:ext uri="{386F3935-93C4-4BCD-93E2-E3B085C9AB24}">
+                <p16:designElem xmlns:p16="http://schemas.microsoft.com/office/powerpoint/2015/main" val="1"/>
+              </p:ext>
+            </p:extLst>
+          </p:nvPr>
+        </p:nvSpPr>
+        <p:spPr>
+          <a:xfrm flipH="1">
+            <a:off x="8115299" y="-1"/>
+            <a:ext cx="4076698" cy="1590742"/>
+          </a:xfrm>
+          <a:prstGeom prst="rect">
+            <a:avLst/>
+          </a:prstGeom>
+          <a:gradFill>
+            <a:gsLst>
+              <a:gs pos="0">
+                <a:schemeClr val="accent1">
+                  <a:alpha val="66000"/>
+                </a:schemeClr>
+              </a:gs>
+              <a:gs pos="100000">
+                <a:srgbClr val="000000">
+                  <a:alpha val="30000"/>
+                </a:srgbClr>
+              </a:gs>
+            </a:gsLst>
+            <a:lin ang="13200000" scaled="0"/>
+          </a:gradFill>
+          <a:ln>
+            <a:noFill/>
+          </a:ln>
+        </p:spPr>
+        <p:style>
+          <a:lnRef idx="2">
+            <a:schemeClr val="accent1">
+              <a:shade val="50000"/>
+            </a:schemeClr>
+          </a:lnRef>
+          <a:fillRef idx="1">
+            <a:schemeClr val="accent1"/>
+          </a:fillRef>
+          <a:effectRef idx="0">
+            <a:schemeClr val="accent1"/>
+          </a:effectRef>
+          <a:fontRef idx="minor">
+            <a:schemeClr val="lt1"/>
+          </a:fontRef>
+        </p:style>
+        <p:txBody>
+          <a:bodyPr rtlCol="0" anchor="ctr"/>
+          <a:lstStyle/>
+          <a:p>
+            <a:pPr algn="ctr"/>
+            <a:endParaRPr lang="en-US"/>
+          </a:p>
+        </p:txBody>
+      </p:sp>
+      <p:sp>
+        <p:nvSpPr>
+          <p:cNvPr id="16" name="Rectangle 15">
+            <a:extLst>
+              <a:ext uri="{FF2B5EF4-FFF2-40B4-BE49-F238E27FC236}">
+                <a16:creationId xmlns:a16="http://schemas.microsoft.com/office/drawing/2014/main" id="{D8E40328-92E0-E068-C270-295ECD0F78B7}"/>
+              </a:ext>
+              <a:ext uri="{C183D7F6-B498-43B3-948B-1728B52AA6E4}">
+                <adec:decorative xmlns:adec="http://schemas.microsoft.com/office/drawing/2017/decorative" val="1"/>
+              </a:ext>
+            </a:extLst>
+          </p:cNvPr>
+          <p:cNvSpPr>
+            <a:spLocks noGrp="1" noRot="1" noChangeAspect="1" noMove="1" noResize="1" noEditPoints="1" noAdjustHandles="1" noChangeArrowheads="1" noChangeShapeType="1" noTextEdit="1"/>
+          </p:cNvSpPr>
+          <p:nvPr>
+            <p:extLst>
+              <p:ext uri="{386F3935-93C4-4BCD-93E2-E3B085C9AB24}">
+                <p16:designElem xmlns:p16="http://schemas.microsoft.com/office/powerpoint/2015/main" val="1"/>
+              </p:ext>
+            </p:extLst>
+          </p:nvPr>
+        </p:nvSpPr>
+        <p:spPr>
+          <a:xfrm>
+            <a:off x="459350" y="-1"/>
+            <a:ext cx="11732646" cy="1597433"/>
+          </a:xfrm>
+          <a:prstGeom prst="rect">
+            <a:avLst/>
+          </a:prstGeom>
+          <a:gradFill>
+            <a:gsLst>
+              <a:gs pos="50000">
+                <a:srgbClr val="000000">
+                  <a:alpha val="0"/>
+                </a:srgbClr>
+              </a:gs>
+              <a:gs pos="99000">
+                <a:schemeClr val="accent1">
+                  <a:lumMod val="50000"/>
+                  <a:alpha val="52000"/>
+                </a:schemeClr>
+              </a:gs>
+            </a:gsLst>
+            <a:lin ang="16800000" scaled="0"/>
+          </a:gradFill>
+          <a:ln>
+            <a:noFill/>
+          </a:ln>
+        </p:spPr>
+        <p:style>
+          <a:lnRef idx="2">
+            <a:schemeClr val="accent1">
+              <a:shade val="50000"/>
+            </a:schemeClr>
+          </a:lnRef>
+          <a:fillRef idx="1">
+            <a:schemeClr val="accent1"/>
+          </a:fillRef>
+          <a:effectRef idx="0">
+            <a:schemeClr val="accent1"/>
+          </a:effectRef>
+          <a:fontRef idx="minor">
+            <a:schemeClr val="lt1"/>
+          </a:fontRef>
+        </p:style>
+        <p:txBody>
+          <a:bodyPr rtlCol="0" anchor="ctr"/>
+          <a:lstStyle/>
+          <a:p>
+            <a:pPr algn="ctr"/>
+            <a:endParaRPr lang="en-US"/>
+          </a:p>
+        </p:txBody>
+      </p:sp>
+      <p:sp>
+        <p:nvSpPr>
+          <p:cNvPr id="2" name="Titolo 1">
+            <a:extLst>
+              <a:ext uri="{FF2B5EF4-FFF2-40B4-BE49-F238E27FC236}">
+                <a16:creationId xmlns:a16="http://schemas.microsoft.com/office/drawing/2014/main" id="{65D22C9A-C26E-57EE-FA0C-95E27EC92C76}"/>
+              </a:ext>
+            </a:extLst>
+          </p:cNvPr>
+          <p:cNvSpPr>
+            <a:spLocks noGrp="1"/>
+          </p:cNvSpPr>
+          <p:nvPr>
+            <p:ph type="title"/>
+          </p:nvPr>
+        </p:nvSpPr>
+        <p:spPr>
+          <a:xfrm>
+            <a:off x="1371599" y="294538"/>
+            <a:ext cx="9895951" cy="1033669"/>
+          </a:xfrm>
+        </p:spPr>
+        <p:txBody>
+          <a:bodyPr>
+            <a:normAutofit/>
+          </a:bodyPr>
+          <a:lstStyle/>
+          <a:p>
+            <a:r>
+              <a:rPr lang="it-CH" sz="4000" b="0" i="0" u="none" strike="noStrike" dirty="0">
+                <a:solidFill>
+                  <a:srgbClr val="FFFFFF"/>
+                </a:solidFill>
+                <a:effectLst/>
+                <a:latin typeface="-webkit-standard"/>
+              </a:rPr>
+              <a:t>Accademic pressure related to study hours</a:t>
+            </a:r>
+            <a:endParaRPr lang="it-IT" sz="4000" dirty="0">
+              <a:solidFill>
+                <a:srgbClr val="FFFFFF"/>
+              </a:solidFill>
+            </a:endParaRPr>
+          </a:p>
+        </p:txBody>
+      </p:sp>
+      <p:pic>
+        <p:nvPicPr>
+          <p:cNvPr id="4" name="Immagine 3" descr="Immagine che contiene testo, diagramma, linea, Diagramma&#10;&#10;Il contenuto generato dall'IA potrebbe non essere corretto.">
+            <a:extLst>
+              <a:ext uri="{FF2B5EF4-FFF2-40B4-BE49-F238E27FC236}">
+                <a16:creationId xmlns:a16="http://schemas.microsoft.com/office/drawing/2014/main" id="{66979F32-F28D-3B5A-B65B-064545EB0794}"/>
+              </a:ext>
+            </a:extLst>
+          </p:cNvPr>
+          <p:cNvPicPr>
+            <a:picLocks noChangeAspect="1"/>
+          </p:cNvPicPr>
+          <p:nvPr/>
+        </p:nvPicPr>
+        <p:blipFill>
+          <a:blip r:embed="rId3"/>
+          <a:stretch>
+            <a:fillRect/>
+          </a:stretch>
+        </p:blipFill>
+        <p:spPr>
+          <a:xfrm>
+            <a:off x="609599" y="1885279"/>
+            <a:ext cx="10904887" cy="4297807"/>
+          </a:xfrm>
+          <a:prstGeom prst="rect">
+            <a:avLst/>
+          </a:prstGeom>
+          <a:ln w="28575">
+            <a:solidFill>
+              <a:schemeClr val="tx1"/>
+            </a:solidFill>
+          </a:ln>
+        </p:spPr>
+      </p:pic>
+      <p:sp>
+        <p:nvSpPr>
+          <p:cNvPr id="3" name="Segnaposto numero diapositiva 2">
+            <a:extLst>
+              <a:ext uri="{FF2B5EF4-FFF2-40B4-BE49-F238E27FC236}">
+                <a16:creationId xmlns:a16="http://schemas.microsoft.com/office/drawing/2014/main" id="{B277B9F8-9CC0-420D-B53B-56A2307A083B}"/>
+              </a:ext>
+            </a:extLst>
+          </p:cNvPr>
+          <p:cNvSpPr>
+            <a:spLocks noGrp="1"/>
+          </p:cNvSpPr>
+          <p:nvPr>
+            <p:ph type="sldNum" sz="quarter" idx="12"/>
+          </p:nvPr>
+        </p:nvSpPr>
+        <p:spPr/>
+        <p:txBody>
+          <a:bodyPr/>
+          <a:lstStyle/>
+          <a:p>
+            <a:fld id="{DDE33EDC-7B95-0F48-AC5F-7FA810C80076}" type="slidenum">
+              <a:rPr lang="it-IT" smtClean="0"/>
+              <a:t>10</a:t>
+            </a:fld>
+            <a:endParaRPr lang="it-IT"/>
+          </a:p>
+        </p:txBody>
+      </p:sp>
+    </p:spTree>
+    <p:extLst>
+      <p:ext uri="{BB962C8B-B14F-4D97-AF65-F5344CB8AC3E}">
+        <p14:creationId xmlns:p14="http://schemas.microsoft.com/office/powerpoint/2010/main" val="722361553"/>
+      </p:ext>
+    </p:extLst>
+  </p:cSld>
+  <p:clrMapOvr>
+    <a:masterClrMapping/>
+  </p:clrMapOvr>
+</p:sld>
+</file>
+
 <file path=ppt/slides/slide2.xml><?xml version="1.0" encoding="utf-8"?>
 <p:sld xmlns:a="http://schemas.openxmlformats.org/drawingml/2006/main" xmlns:r="http://schemas.openxmlformats.org/officeDocument/2006/relationships" xmlns:p="http://schemas.openxmlformats.org/presentationml/2006/main">
   <p:cSld>
@@ -6321,57 +7069,22 @@
       </p:sp>
       <p:pic>
         <p:nvPicPr>
-          <p:cNvPr id="11" name="Immagine 10" descr="Immagine che contiene testo, schermata, diagramma, Carattere&#10;&#10;Il contenuto generato dall'IA potrebbe non essere corretto.">
-            <a:extLst>
-              <a:ext uri="{FF2B5EF4-FFF2-40B4-BE49-F238E27FC236}">
-                <a16:creationId xmlns:a16="http://schemas.microsoft.com/office/drawing/2014/main" id="{75E159E3-5A56-A4C2-0E53-D031895DFBBB}"/>
+          <p:cNvPr id="7" name="Segnaposto contenuto 6" descr="Immagine che contiene schermata, Carattere, diagramma, logo&#10;&#10;Il contenuto generato dall'IA potrebbe non essere corretto.">
+            <a:extLst>
+              <a:ext uri="{FF2B5EF4-FFF2-40B4-BE49-F238E27FC236}">
+                <a16:creationId xmlns:a16="http://schemas.microsoft.com/office/drawing/2014/main" id="{A2B3333F-6511-08D9-78F2-882E6F7A217F}"/>
               </a:ext>
             </a:extLst>
           </p:cNvPr>
           <p:cNvPicPr>
-            <a:picLocks noChangeAspect="1"/>
+            <a:picLocks noGrp="1" noChangeAspect="1"/>
           </p:cNvPicPr>
-          <p:nvPr/>
+          <p:nvPr>
+            <p:ph idx="1"/>
+          </p:nvPr>
         </p:nvPicPr>
         <p:blipFill>
           <a:blip r:embed="rId3"/>
-          <a:stretch>
-            <a:fillRect/>
-          </a:stretch>
-        </p:blipFill>
-        <p:spPr>
-          <a:xfrm>
-            <a:off x="1156036" y="2210634"/>
-            <a:ext cx="10588672" cy="4173181"/>
-          </a:xfrm>
-          <a:prstGeom prst="rect">
-            <a:avLst/>
-          </a:prstGeom>
-          <a:ln w="28575">
-            <a:solidFill>
-              <a:schemeClr val="tx1"/>
-            </a:solidFill>
-          </a:ln>
-        </p:spPr>
-      </p:pic>
-      <p:pic>
-        <p:nvPicPr>
-          <p:cNvPr id="7" name="Segnaposto contenuto 6" descr="Immagine che contiene schermata, Carattere, diagramma, logo&#10;&#10;Il contenuto generato dall'IA potrebbe non essere corretto.">
-            <a:extLst>
-              <a:ext uri="{FF2B5EF4-FFF2-40B4-BE49-F238E27FC236}">
-                <a16:creationId xmlns:a16="http://schemas.microsoft.com/office/drawing/2014/main" id="{A2B3333F-6511-08D9-78F2-882E6F7A217F}"/>
-              </a:ext>
-            </a:extLst>
-          </p:cNvPr>
-          <p:cNvPicPr>
-            <a:picLocks noGrp="1" noChangeAspect="1"/>
-          </p:cNvPicPr>
-          <p:nvPr>
-            <p:ph idx="1"/>
-          </p:nvPr>
-        </p:nvPicPr>
-        <p:blipFill>
-          <a:blip r:embed="rId4"/>
           <a:srcRect l="32333"/>
           <a:stretch/>
         </p:blipFill>
@@ -6524,21 +7237,618 @@
                             </p:childTnLst>
                           </p:cTn>
                         </p:par>
+                      </p:childTnLst>
+                    </p:cTn>
+                  </p:par>
+                </p:childTnLst>
+              </p:cTn>
+              <p:prevCondLst>
+                <p:cond evt="onPrev" delay="0">
+                  <p:tgtEl>
+                    <p:sldTgt/>
+                  </p:tgtEl>
+                </p:cond>
+              </p:prevCondLst>
+              <p:nextCondLst>
+                <p:cond evt="onNext" delay="0">
+                  <p:tgtEl>
+                    <p:sldTgt/>
+                  </p:tgtEl>
+                </p:cond>
+              </p:nextCondLst>
+            </p:seq>
+          </p:childTnLst>
+        </p:cTn>
+      </p:par>
+    </p:tnLst>
+  </p:timing>
+</p:sld>
+</file>
+
+<file path=ppt/slides/slide4.xml><?xml version="1.0" encoding="utf-8"?>
+<p:sld xmlns:a="http://schemas.openxmlformats.org/drawingml/2006/main" xmlns:r="http://schemas.openxmlformats.org/officeDocument/2006/relationships" xmlns:p="http://schemas.openxmlformats.org/presentationml/2006/main">
+  <p:cSld>
+    <p:bg>
+      <p:bgPr>
+        <a:solidFill>
+          <a:schemeClr val="bg1"/>
+        </a:solidFill>
+        <a:effectLst/>
+      </p:bgPr>
+    </p:bg>
+    <p:spTree>
+      <p:nvGrpSpPr>
+        <p:cNvPr id="1" name="">
+          <a:extLst>
+            <a:ext uri="{FF2B5EF4-FFF2-40B4-BE49-F238E27FC236}">
+              <a16:creationId xmlns:a16="http://schemas.microsoft.com/office/drawing/2014/main" id="{A6658D17-7803-109A-A01C-2C735BBAFCDF}"/>
+            </a:ext>
+          </a:extLst>
+        </p:cNvPr>
+        <p:cNvGrpSpPr/>
+        <p:nvPr/>
+      </p:nvGrpSpPr>
+      <p:grpSpPr>
+        <a:xfrm>
+          <a:off x="0" y="0"/>
+          <a:ext cx="0" cy="0"/>
+          <a:chOff x="0" y="0"/>
+          <a:chExt cx="0" cy="0"/>
+        </a:xfrm>
+      </p:grpSpPr>
+      <p:sp useBgFill="1">
+        <p:nvSpPr>
+          <p:cNvPr id="8" name="Rectangle 7">
+            <a:extLst>
+              <a:ext uri="{FF2B5EF4-FFF2-40B4-BE49-F238E27FC236}">
+                <a16:creationId xmlns:a16="http://schemas.microsoft.com/office/drawing/2014/main" id="{5989DB15-3F30-187A-7991-5DB20F7303C7}"/>
+              </a:ext>
+              <a:ext uri="{C183D7F6-B498-43B3-948B-1728B52AA6E4}">
+                <adec:decorative xmlns:adec="http://schemas.microsoft.com/office/drawing/2017/decorative" val="1"/>
+              </a:ext>
+            </a:extLst>
+          </p:cNvPr>
+          <p:cNvSpPr>
+            <a:spLocks noGrp="1" noRot="1" noChangeAspect="1" noMove="1" noResize="1" noEditPoints="1" noAdjustHandles="1" noChangeArrowheads="1" noChangeShapeType="1" noTextEdit="1"/>
+          </p:cNvSpPr>
+          <p:nvPr>
+            <p:extLst>
+              <p:ext uri="{386F3935-93C4-4BCD-93E2-E3B085C9AB24}">
+                <p16:designElem xmlns:p16="http://schemas.microsoft.com/office/powerpoint/2015/main" val="1"/>
+              </p:ext>
+            </p:extLst>
+          </p:nvPr>
+        </p:nvSpPr>
+        <p:spPr>
+          <a:xfrm>
+            <a:off x="0" y="0"/>
+            <a:ext cx="12192000" cy="6858000"/>
+          </a:xfrm>
+          <a:prstGeom prst="rect">
+            <a:avLst/>
+          </a:prstGeom>
+          <a:ln w="12700" cap="flat" cmpd="sng" algn="ctr">
+            <a:noFill/>
+            <a:prstDash val="solid"/>
+            <a:miter lim="800000"/>
+          </a:ln>
+          <a:effectLst/>
+          <a:extLst>
+            <a:ext uri="{91240B29-F687-4F45-9708-019B960494DF}">
+              <a14:hiddenLine xmlns:a14="http://schemas.microsoft.com/office/drawing/2010/main" w="12700" cap="flat" cmpd="sng" algn="ctr">
+                <a:solidFill>
+                  <a:schemeClr val="accent1">
+                    <a:shade val="50000"/>
+                  </a:schemeClr>
+                </a:solidFill>
+                <a:prstDash val="solid"/>
+                <a:miter lim="800000"/>
+              </a14:hiddenLine>
+            </a:ext>
+          </a:extLst>
+        </p:spPr>
+        <p:style>
+          <a:lnRef idx="2">
+            <a:schemeClr val="accent1">
+              <a:shade val="50000"/>
+            </a:schemeClr>
+          </a:lnRef>
+          <a:fillRef idx="1">
+            <a:schemeClr val="accent1"/>
+          </a:fillRef>
+          <a:effectRef idx="0">
+            <a:schemeClr val="accent1"/>
+          </a:effectRef>
+          <a:fontRef idx="minor">
+            <a:schemeClr val="lt1"/>
+          </a:fontRef>
+        </p:style>
+        <p:txBody>
+          <a:bodyPr rtlCol="0" anchor="ctr"/>
+          <a:lstStyle/>
+          <a:p>
+            <a:pPr algn="ctr"/>
+            <a:endParaRPr lang="en-US"/>
+          </a:p>
+        </p:txBody>
+      </p:sp>
+      <p:sp>
+        <p:nvSpPr>
+          <p:cNvPr id="10" name="Rectangle 9">
+            <a:extLst>
+              <a:ext uri="{FF2B5EF4-FFF2-40B4-BE49-F238E27FC236}">
+                <a16:creationId xmlns:a16="http://schemas.microsoft.com/office/drawing/2014/main" id="{3DE922A0-86C7-B561-C460-E4B224FBE48B}"/>
+              </a:ext>
+              <a:ext uri="{C183D7F6-B498-43B3-948B-1728B52AA6E4}">
+                <adec:decorative xmlns:adec="http://schemas.microsoft.com/office/drawing/2017/decorative" val="1"/>
+              </a:ext>
+            </a:extLst>
+          </p:cNvPr>
+          <p:cNvSpPr>
+            <a:spLocks noGrp="1" noRot="1" noChangeAspect="1" noMove="1" noResize="1" noEditPoints="1" noAdjustHandles="1" noChangeArrowheads="1" noChangeShapeType="1" noTextEdit="1"/>
+          </p:cNvSpPr>
+          <p:nvPr>
+            <p:extLst>
+              <p:ext uri="{386F3935-93C4-4BCD-93E2-E3B085C9AB24}">
+                <p16:designElem xmlns:p16="http://schemas.microsoft.com/office/powerpoint/2015/main" val="1"/>
+              </p:ext>
+            </p:extLst>
+          </p:nvPr>
+        </p:nvSpPr>
+        <p:spPr>
+          <a:xfrm flipH="1">
+            <a:off x="-1" y="-1"/>
+            <a:ext cx="12191998" cy="1590742"/>
+          </a:xfrm>
+          <a:prstGeom prst="rect">
+            <a:avLst/>
+          </a:prstGeom>
+          <a:gradFill>
+            <a:gsLst>
+              <a:gs pos="0">
+                <a:srgbClr val="000000"/>
+              </a:gs>
+              <a:gs pos="100000">
+                <a:schemeClr val="accent1">
+                  <a:lumMod val="75000"/>
+                </a:schemeClr>
+              </a:gs>
+            </a:gsLst>
+            <a:lin ang="8400000" scaled="0"/>
+          </a:gradFill>
+          <a:ln>
+            <a:noFill/>
+          </a:ln>
+        </p:spPr>
+        <p:style>
+          <a:lnRef idx="2">
+            <a:schemeClr val="accent1">
+              <a:shade val="50000"/>
+            </a:schemeClr>
+          </a:lnRef>
+          <a:fillRef idx="1">
+            <a:schemeClr val="accent1"/>
+          </a:fillRef>
+          <a:effectRef idx="0">
+            <a:schemeClr val="accent1"/>
+          </a:effectRef>
+          <a:fontRef idx="minor">
+            <a:schemeClr val="lt1"/>
+          </a:fontRef>
+        </p:style>
+        <p:txBody>
+          <a:bodyPr rtlCol="0" anchor="ctr"/>
+          <a:lstStyle/>
+          <a:p>
+            <a:pPr algn="ctr"/>
+            <a:endParaRPr lang="en-US"/>
+          </a:p>
+        </p:txBody>
+      </p:sp>
+      <p:sp>
+        <p:nvSpPr>
+          <p:cNvPr id="12" name="Rectangle 11">
+            <a:extLst>
+              <a:ext uri="{FF2B5EF4-FFF2-40B4-BE49-F238E27FC236}">
+                <a16:creationId xmlns:a16="http://schemas.microsoft.com/office/drawing/2014/main" id="{9D36A936-4698-C45A-A07E-62F1F3092D6E}"/>
+              </a:ext>
+              <a:ext uri="{C183D7F6-B498-43B3-948B-1728B52AA6E4}">
+                <adec:decorative xmlns:adec="http://schemas.microsoft.com/office/drawing/2017/decorative" val="1"/>
+              </a:ext>
+            </a:extLst>
+          </p:cNvPr>
+          <p:cNvSpPr>
+            <a:spLocks noGrp="1" noRot="1" noChangeAspect="1" noMove="1" noResize="1" noEditPoints="1" noAdjustHandles="1" noChangeArrowheads="1" noChangeShapeType="1" noTextEdit="1"/>
+          </p:cNvSpPr>
+          <p:nvPr>
+            <p:extLst>
+              <p:ext uri="{386F3935-93C4-4BCD-93E2-E3B085C9AB24}">
+                <p16:designElem xmlns:p16="http://schemas.microsoft.com/office/powerpoint/2015/main" val="1"/>
+              </p:ext>
+            </p:extLst>
+          </p:nvPr>
+        </p:nvSpPr>
+        <p:spPr>
+          <a:xfrm rot="10800000" flipH="1">
+            <a:off x="-3" y="0"/>
+            <a:ext cx="8115306" cy="1590742"/>
+          </a:xfrm>
+          <a:prstGeom prst="rect">
+            <a:avLst/>
+          </a:prstGeom>
+          <a:gradFill>
+            <a:gsLst>
+              <a:gs pos="20000">
+                <a:schemeClr val="accent1">
+                  <a:alpha val="0"/>
+                </a:schemeClr>
+              </a:gs>
+              <a:gs pos="100000">
+                <a:schemeClr val="accent1">
+                  <a:lumMod val="50000"/>
+                  <a:alpha val="55000"/>
+                </a:schemeClr>
+              </a:gs>
+            </a:gsLst>
+            <a:lin ang="13800000" scaled="0"/>
+          </a:gradFill>
+          <a:ln>
+            <a:noFill/>
+          </a:ln>
+        </p:spPr>
+        <p:style>
+          <a:lnRef idx="2">
+            <a:schemeClr val="accent1">
+              <a:shade val="50000"/>
+            </a:schemeClr>
+          </a:lnRef>
+          <a:fillRef idx="1">
+            <a:schemeClr val="accent1"/>
+          </a:fillRef>
+          <a:effectRef idx="0">
+            <a:schemeClr val="accent1"/>
+          </a:effectRef>
+          <a:fontRef idx="minor">
+            <a:schemeClr val="lt1"/>
+          </a:fontRef>
+        </p:style>
+        <p:txBody>
+          <a:bodyPr rtlCol="0" anchor="ctr"/>
+          <a:lstStyle/>
+          <a:p>
+            <a:pPr algn="ctr"/>
+            <a:endParaRPr lang="en-US"/>
+          </a:p>
+        </p:txBody>
+      </p:sp>
+      <p:sp>
+        <p:nvSpPr>
+          <p:cNvPr id="14" name="Rectangle 13">
+            <a:extLst>
+              <a:ext uri="{FF2B5EF4-FFF2-40B4-BE49-F238E27FC236}">
+                <a16:creationId xmlns:a16="http://schemas.microsoft.com/office/drawing/2014/main" id="{3131B58A-CDE7-4DBE-27C4-D2BBEECB849A}"/>
+              </a:ext>
+              <a:ext uri="{C183D7F6-B498-43B3-948B-1728B52AA6E4}">
+                <adec:decorative xmlns:adec="http://schemas.microsoft.com/office/drawing/2017/decorative" val="1"/>
+              </a:ext>
+            </a:extLst>
+          </p:cNvPr>
+          <p:cNvSpPr>
+            <a:spLocks noGrp="1" noRot="1" noChangeAspect="1" noMove="1" noResize="1" noEditPoints="1" noAdjustHandles="1" noChangeArrowheads="1" noChangeShapeType="1" noTextEdit="1"/>
+          </p:cNvSpPr>
+          <p:nvPr>
+            <p:extLst>
+              <p:ext uri="{386F3935-93C4-4BCD-93E2-E3B085C9AB24}">
+                <p16:designElem xmlns:p16="http://schemas.microsoft.com/office/powerpoint/2015/main" val="1"/>
+              </p:ext>
+            </p:extLst>
+          </p:nvPr>
+        </p:nvSpPr>
+        <p:spPr>
+          <a:xfrm flipH="1">
+            <a:off x="8115299" y="-1"/>
+            <a:ext cx="4076698" cy="1590742"/>
+          </a:xfrm>
+          <a:prstGeom prst="rect">
+            <a:avLst/>
+          </a:prstGeom>
+          <a:gradFill>
+            <a:gsLst>
+              <a:gs pos="0">
+                <a:schemeClr val="accent1">
+                  <a:alpha val="66000"/>
+                </a:schemeClr>
+              </a:gs>
+              <a:gs pos="100000">
+                <a:srgbClr val="000000">
+                  <a:alpha val="30000"/>
+                </a:srgbClr>
+              </a:gs>
+            </a:gsLst>
+            <a:lin ang="13200000" scaled="0"/>
+          </a:gradFill>
+          <a:ln>
+            <a:noFill/>
+          </a:ln>
+        </p:spPr>
+        <p:style>
+          <a:lnRef idx="2">
+            <a:schemeClr val="accent1">
+              <a:shade val="50000"/>
+            </a:schemeClr>
+          </a:lnRef>
+          <a:fillRef idx="1">
+            <a:schemeClr val="accent1"/>
+          </a:fillRef>
+          <a:effectRef idx="0">
+            <a:schemeClr val="accent1"/>
+          </a:effectRef>
+          <a:fontRef idx="minor">
+            <a:schemeClr val="lt1"/>
+          </a:fontRef>
+        </p:style>
+        <p:txBody>
+          <a:bodyPr rtlCol="0" anchor="ctr"/>
+          <a:lstStyle/>
+          <a:p>
+            <a:pPr algn="ctr"/>
+            <a:endParaRPr lang="en-US"/>
+          </a:p>
+        </p:txBody>
+      </p:sp>
+      <p:sp>
+        <p:nvSpPr>
+          <p:cNvPr id="16" name="Rectangle 15">
+            <a:extLst>
+              <a:ext uri="{FF2B5EF4-FFF2-40B4-BE49-F238E27FC236}">
+                <a16:creationId xmlns:a16="http://schemas.microsoft.com/office/drawing/2014/main" id="{6B1665EB-5C0F-16DA-37A9-F7443464346A}"/>
+              </a:ext>
+              <a:ext uri="{C183D7F6-B498-43B3-948B-1728B52AA6E4}">
+                <adec:decorative xmlns:adec="http://schemas.microsoft.com/office/drawing/2017/decorative" val="1"/>
+              </a:ext>
+            </a:extLst>
+          </p:cNvPr>
+          <p:cNvSpPr>
+            <a:spLocks noGrp="1" noRot="1" noChangeAspect="1" noMove="1" noResize="1" noEditPoints="1" noAdjustHandles="1" noChangeArrowheads="1" noChangeShapeType="1" noTextEdit="1"/>
+          </p:cNvSpPr>
+          <p:nvPr>
+            <p:extLst>
+              <p:ext uri="{386F3935-93C4-4BCD-93E2-E3B085C9AB24}">
+                <p16:designElem xmlns:p16="http://schemas.microsoft.com/office/powerpoint/2015/main" val="1"/>
+              </p:ext>
+            </p:extLst>
+          </p:nvPr>
+        </p:nvSpPr>
+        <p:spPr>
+          <a:xfrm>
+            <a:off x="459350" y="-1"/>
+            <a:ext cx="11732646" cy="1597433"/>
+          </a:xfrm>
+          <a:prstGeom prst="rect">
+            <a:avLst/>
+          </a:prstGeom>
+          <a:gradFill>
+            <a:gsLst>
+              <a:gs pos="50000">
+                <a:srgbClr val="000000">
+                  <a:alpha val="0"/>
+                </a:srgbClr>
+              </a:gs>
+              <a:gs pos="99000">
+                <a:schemeClr val="accent1">
+                  <a:lumMod val="50000"/>
+                  <a:alpha val="52000"/>
+                </a:schemeClr>
+              </a:gs>
+            </a:gsLst>
+            <a:lin ang="16800000" scaled="0"/>
+          </a:gradFill>
+          <a:ln>
+            <a:noFill/>
+          </a:ln>
+        </p:spPr>
+        <p:style>
+          <a:lnRef idx="2">
+            <a:schemeClr val="accent1">
+              <a:shade val="50000"/>
+            </a:schemeClr>
+          </a:lnRef>
+          <a:fillRef idx="1">
+            <a:schemeClr val="accent1"/>
+          </a:fillRef>
+          <a:effectRef idx="0">
+            <a:schemeClr val="accent1"/>
+          </a:effectRef>
+          <a:fontRef idx="minor">
+            <a:schemeClr val="lt1"/>
+          </a:fontRef>
+        </p:style>
+        <p:txBody>
+          <a:bodyPr rtlCol="0" anchor="ctr"/>
+          <a:lstStyle/>
+          <a:p>
+            <a:pPr algn="ctr"/>
+            <a:endParaRPr lang="en-US"/>
+          </a:p>
+        </p:txBody>
+      </p:sp>
+      <p:sp>
+        <p:nvSpPr>
+          <p:cNvPr id="2" name="Titolo 1">
+            <a:extLst>
+              <a:ext uri="{FF2B5EF4-FFF2-40B4-BE49-F238E27FC236}">
+                <a16:creationId xmlns:a16="http://schemas.microsoft.com/office/drawing/2014/main" id="{DF53C0A1-1C30-FCD2-207F-2EB70BA497DE}"/>
+              </a:ext>
+            </a:extLst>
+          </p:cNvPr>
+          <p:cNvSpPr>
+            <a:spLocks noGrp="1"/>
+          </p:cNvSpPr>
+          <p:nvPr>
+            <p:ph type="title"/>
+          </p:nvPr>
+        </p:nvSpPr>
+        <p:spPr>
+          <a:xfrm>
+            <a:off x="1371599" y="294538"/>
+            <a:ext cx="9895951" cy="1033669"/>
+          </a:xfrm>
+        </p:spPr>
+        <p:txBody>
+          <a:bodyPr>
+            <a:normAutofit/>
+          </a:bodyPr>
+          <a:lstStyle/>
+          <a:p>
+            <a:r>
+              <a:rPr lang="it-CH" sz="4000" b="0" i="0" u="none" strike="noStrike" dirty="0">
+                <a:solidFill>
+                  <a:srgbClr val="FFFFFF"/>
+                </a:solidFill>
+                <a:effectLst/>
+                <a:latin typeface="-webkit-standard"/>
+              </a:rPr>
+              <a:t>Dataset composition</a:t>
+            </a:r>
+            <a:endParaRPr lang="it-IT" sz="4000" dirty="0">
+              <a:solidFill>
+                <a:srgbClr val="FFFFFF"/>
+              </a:solidFill>
+            </a:endParaRPr>
+          </a:p>
+        </p:txBody>
+      </p:sp>
+      <p:pic>
+        <p:nvPicPr>
+          <p:cNvPr id="11" name="Immagine 10" descr="Immagine che contiene testo, schermata, diagramma, Carattere&#10;&#10;Il contenuto generato dall'IA potrebbe non essere corretto.">
+            <a:extLst>
+              <a:ext uri="{FF2B5EF4-FFF2-40B4-BE49-F238E27FC236}">
+                <a16:creationId xmlns:a16="http://schemas.microsoft.com/office/drawing/2014/main" id="{B3F2B34B-68D2-0DF9-DB54-8C779EC97EA5}"/>
+              </a:ext>
+            </a:extLst>
+          </p:cNvPr>
+          <p:cNvPicPr>
+            <a:picLocks noChangeAspect="1"/>
+          </p:cNvPicPr>
+          <p:nvPr/>
+        </p:nvPicPr>
+        <p:blipFill>
+          <a:blip r:embed="rId3"/>
+          <a:stretch>
+            <a:fillRect/>
+          </a:stretch>
+        </p:blipFill>
+        <p:spPr>
+          <a:xfrm>
+            <a:off x="1156036" y="2210634"/>
+            <a:ext cx="10588672" cy="4173181"/>
+          </a:xfrm>
+          <a:prstGeom prst="rect">
+            <a:avLst/>
+          </a:prstGeom>
+          <a:ln w="28575">
+            <a:solidFill>
+              <a:schemeClr val="tx1"/>
+            </a:solidFill>
+          </a:ln>
+        </p:spPr>
+      </p:pic>
+      <p:sp>
+        <p:nvSpPr>
+          <p:cNvPr id="3" name="Segnaposto numero diapositiva 2">
+            <a:extLst>
+              <a:ext uri="{FF2B5EF4-FFF2-40B4-BE49-F238E27FC236}">
+                <a16:creationId xmlns:a16="http://schemas.microsoft.com/office/drawing/2014/main" id="{B1816474-CA22-038F-AEE3-86984FC35874}"/>
+              </a:ext>
+            </a:extLst>
+          </p:cNvPr>
+          <p:cNvSpPr>
+            <a:spLocks noGrp="1"/>
+          </p:cNvSpPr>
+          <p:nvPr>
+            <p:ph type="sldNum" sz="quarter" idx="12"/>
+          </p:nvPr>
+        </p:nvSpPr>
+        <p:spPr/>
+        <p:txBody>
+          <a:bodyPr/>
+          <a:lstStyle/>
+          <a:p>
+            <a:fld id="{DDE33EDC-7B95-0F48-AC5F-7FA810C80076}" type="slidenum">
+              <a:rPr lang="it-IT" smtClean="0"/>
+              <a:t>4</a:t>
+            </a:fld>
+            <a:endParaRPr lang="it-IT"/>
+          </a:p>
+        </p:txBody>
+      </p:sp>
+      <p:sp>
+        <p:nvSpPr>
+          <p:cNvPr id="5" name="Segnaposto contenuto 4">
+            <a:extLst>
+              <a:ext uri="{FF2B5EF4-FFF2-40B4-BE49-F238E27FC236}">
+                <a16:creationId xmlns:a16="http://schemas.microsoft.com/office/drawing/2014/main" id="{222BA8C5-1BFC-0054-464B-B3955AF103A3}"/>
+              </a:ext>
+            </a:extLst>
+          </p:cNvPr>
+          <p:cNvSpPr>
+            <a:spLocks noGrp="1"/>
+          </p:cNvSpPr>
+          <p:nvPr>
+            <p:ph idx="1"/>
+          </p:nvPr>
+        </p:nvSpPr>
+        <p:spPr/>
+        <p:txBody>
+          <a:bodyPr/>
+          <a:lstStyle/>
+          <a:p>
+            <a:endParaRPr lang="it-IT"/>
+          </a:p>
+        </p:txBody>
+      </p:sp>
+    </p:spTree>
+    <p:extLst>
+      <p:ext uri="{BB962C8B-B14F-4D97-AF65-F5344CB8AC3E}">
+        <p14:creationId xmlns:p14="http://schemas.microsoft.com/office/powerpoint/2010/main" val="2358339967"/>
+      </p:ext>
+    </p:extLst>
+  </p:cSld>
+  <p:clrMapOvr>
+    <a:masterClrMapping/>
+  </p:clrMapOvr>
+  <p:timing>
+    <p:tnLst>
+      <p:par>
+        <p:cTn id="1" dur="indefinite" restart="never" nodeType="tmRoot">
+          <p:childTnLst>
+            <p:seq concurrent="1" nextAc="seek">
+              <p:cTn id="2" dur="indefinite" nodeType="mainSeq">
+                <p:childTnLst>
+                  <p:par>
+                    <p:cTn id="3" fill="hold">
+                      <p:stCondLst>
+                        <p:cond delay="indefinite"/>
+                        <p:cond evt="onBegin" delay="0">
+                          <p:tn val="2"/>
+                        </p:cond>
+                      </p:stCondLst>
+                      <p:childTnLst>
                         <p:par>
-                          <p:cTn id="11" fill="hold">
+                          <p:cTn id="4" fill="hold">
                             <p:stCondLst>
                               <p:cond delay="0"/>
                             </p:stCondLst>
                             <p:childTnLst>
                               <p:par>
-                                <p:cTn id="12" presetID="1" presetClass="entr" presetSubtype="0" fill="hold" nodeType="afterEffect">
+                                <p:cTn id="5" presetID="1" presetClass="entr" presetSubtype="0" fill="hold" nodeType="afterEffect">
                                   <p:stCondLst>
                                     <p:cond delay="0"/>
                                   </p:stCondLst>
                                   <p:childTnLst>
                                     <p:set>
                                       <p:cBhvr>
-                                        <p:cTn id="13" dur="1" fill="hold">
+                                        <p:cTn id="6" dur="1" fill="hold">
                                           <p:stCondLst>
                                             <p:cond delay="0"/>
                                           </p:stCondLst>
@@ -6588,7 +7898,7 @@
 </p:sld>
 </file>
 
-<file path=ppt/slides/slide4.xml><?xml version="1.0" encoding="utf-8"?>
+<file path=ppt/slides/slide5.xml><?xml version="1.0" encoding="utf-8"?>
 <p:sld xmlns:a="http://schemas.openxmlformats.org/drawingml/2006/main" xmlns:r="http://schemas.openxmlformats.org/officeDocument/2006/relationships" xmlns:p="http://schemas.openxmlformats.org/presentationml/2006/main">
   <p:cSld>
     <p:bg>
@@ -7030,41 +8340,6 @@
           </a:ln>
         </p:spPr>
       </p:pic>
-      <p:pic>
-        <p:nvPicPr>
-          <p:cNvPr id="19" name="Immagine 18" descr="Immagine che contiene testo, schermata, Carattere, linea&#10;&#10;Il contenuto generato dall'IA potrebbe non essere corretto.">
-            <a:extLst>
-              <a:ext uri="{FF2B5EF4-FFF2-40B4-BE49-F238E27FC236}">
-                <a16:creationId xmlns:a16="http://schemas.microsoft.com/office/drawing/2014/main" id="{A22E7EC5-5C8E-FA6B-77D6-141FC7B966D8}"/>
-              </a:ext>
-            </a:extLst>
-          </p:cNvPr>
-          <p:cNvPicPr>
-            <a:picLocks noChangeAspect="1"/>
-          </p:cNvPicPr>
-          <p:nvPr/>
-        </p:nvPicPr>
-        <p:blipFill>
-          <a:blip r:embed="rId4"/>
-          <a:stretch>
-            <a:fillRect/>
-          </a:stretch>
-        </p:blipFill>
-        <p:spPr>
-          <a:xfrm>
-            <a:off x="972218" y="1856251"/>
-            <a:ext cx="10798868" cy="4256023"/>
-          </a:xfrm>
-          <a:prstGeom prst="rect">
-            <a:avLst/>
-          </a:prstGeom>
-          <a:ln w="28575">
-            <a:solidFill>
-              <a:schemeClr val="tx1"/>
-            </a:solidFill>
-          </a:ln>
-        </p:spPr>
-      </p:pic>
       <p:sp>
         <p:nvSpPr>
           <p:cNvPr id="2" name="Titolo 1">
@@ -7134,7 +8409,7 @@
           <a:p>
             <a:fld id="{DDE33EDC-7B95-0F48-AC5F-7FA810C80076}" type="slidenum">
               <a:rPr lang="it-IT" smtClean="0"/>
-              <a:t>4</a:t>
+              <a:t>5</a:t>
             </a:fld>
             <a:endParaRPr lang="it-IT"/>
           </a:p>
@@ -7200,21 +8475,593 @@
                             </p:childTnLst>
                           </p:cTn>
                         </p:par>
+                      </p:childTnLst>
+                    </p:cTn>
+                  </p:par>
+                </p:childTnLst>
+              </p:cTn>
+              <p:prevCondLst>
+                <p:cond evt="onPrev" delay="0">
+                  <p:tgtEl>
+                    <p:sldTgt/>
+                  </p:tgtEl>
+                </p:cond>
+              </p:prevCondLst>
+              <p:nextCondLst>
+                <p:cond evt="onNext" delay="0">
+                  <p:tgtEl>
+                    <p:sldTgt/>
+                  </p:tgtEl>
+                </p:cond>
+              </p:nextCondLst>
+            </p:seq>
+          </p:childTnLst>
+        </p:cTn>
+      </p:par>
+    </p:tnLst>
+  </p:timing>
+</p:sld>
+</file>
+
+<file path=ppt/slides/slide6.xml><?xml version="1.0" encoding="utf-8"?>
+<p:sld xmlns:a="http://schemas.openxmlformats.org/drawingml/2006/main" xmlns:r="http://schemas.openxmlformats.org/officeDocument/2006/relationships" xmlns:p="http://schemas.openxmlformats.org/presentationml/2006/main">
+  <p:cSld>
+    <p:bg>
+      <p:bgPr>
+        <a:solidFill>
+          <a:schemeClr val="bg1"/>
+        </a:solidFill>
+        <a:effectLst/>
+      </p:bgPr>
+    </p:bg>
+    <p:spTree>
+      <p:nvGrpSpPr>
+        <p:cNvPr id="1" name="">
+          <a:extLst>
+            <a:ext uri="{FF2B5EF4-FFF2-40B4-BE49-F238E27FC236}">
+              <a16:creationId xmlns:a16="http://schemas.microsoft.com/office/drawing/2014/main" id="{B7AA0216-90F3-5E71-F42E-821401DAB440}"/>
+            </a:ext>
+          </a:extLst>
+        </p:cNvPr>
+        <p:cNvGrpSpPr/>
+        <p:nvPr/>
+      </p:nvGrpSpPr>
+      <p:grpSpPr>
+        <a:xfrm>
+          <a:off x="0" y="0"/>
+          <a:ext cx="0" cy="0"/>
+          <a:chOff x="0" y="0"/>
+          <a:chExt cx="0" cy="0"/>
+        </a:xfrm>
+      </p:grpSpPr>
+      <p:sp useBgFill="1">
+        <p:nvSpPr>
+          <p:cNvPr id="8" name="Rectangle 7">
+            <a:extLst>
+              <a:ext uri="{FF2B5EF4-FFF2-40B4-BE49-F238E27FC236}">
+                <a16:creationId xmlns:a16="http://schemas.microsoft.com/office/drawing/2014/main" id="{FD253743-C18C-430C-C5A4-C3A8610807FC}"/>
+              </a:ext>
+              <a:ext uri="{C183D7F6-B498-43B3-948B-1728B52AA6E4}">
+                <adec:decorative xmlns:adec="http://schemas.microsoft.com/office/drawing/2017/decorative" val="1"/>
+              </a:ext>
+            </a:extLst>
+          </p:cNvPr>
+          <p:cNvSpPr>
+            <a:spLocks noGrp="1" noRot="1" noChangeAspect="1" noMove="1" noResize="1" noEditPoints="1" noAdjustHandles="1" noChangeArrowheads="1" noChangeShapeType="1" noTextEdit="1"/>
+          </p:cNvSpPr>
+          <p:nvPr>
+            <p:extLst>
+              <p:ext uri="{386F3935-93C4-4BCD-93E2-E3B085C9AB24}">
+                <p16:designElem xmlns:p16="http://schemas.microsoft.com/office/powerpoint/2015/main" val="1"/>
+              </p:ext>
+            </p:extLst>
+          </p:nvPr>
+        </p:nvSpPr>
+        <p:spPr>
+          <a:xfrm>
+            <a:off x="0" y="0"/>
+            <a:ext cx="12192000" cy="6858000"/>
+          </a:xfrm>
+          <a:prstGeom prst="rect">
+            <a:avLst/>
+          </a:prstGeom>
+          <a:ln w="12700" cap="flat" cmpd="sng" algn="ctr">
+            <a:noFill/>
+            <a:prstDash val="solid"/>
+            <a:miter lim="800000"/>
+          </a:ln>
+          <a:effectLst/>
+          <a:extLst>
+            <a:ext uri="{91240B29-F687-4F45-9708-019B960494DF}">
+              <a14:hiddenLine xmlns:a14="http://schemas.microsoft.com/office/drawing/2010/main" w="12700" cap="flat" cmpd="sng" algn="ctr">
+                <a:solidFill>
+                  <a:schemeClr val="accent1">
+                    <a:shade val="50000"/>
+                  </a:schemeClr>
+                </a:solidFill>
+                <a:prstDash val="solid"/>
+                <a:miter lim="800000"/>
+              </a14:hiddenLine>
+            </a:ext>
+          </a:extLst>
+        </p:spPr>
+        <p:style>
+          <a:lnRef idx="2">
+            <a:schemeClr val="accent1">
+              <a:shade val="50000"/>
+            </a:schemeClr>
+          </a:lnRef>
+          <a:fillRef idx="1">
+            <a:schemeClr val="accent1"/>
+          </a:fillRef>
+          <a:effectRef idx="0">
+            <a:schemeClr val="accent1"/>
+          </a:effectRef>
+          <a:fontRef idx="minor">
+            <a:schemeClr val="lt1"/>
+          </a:fontRef>
+        </p:style>
+        <p:txBody>
+          <a:bodyPr rtlCol="0" anchor="ctr"/>
+          <a:lstStyle/>
+          <a:p>
+            <a:pPr algn="ctr"/>
+            <a:endParaRPr lang="en-US"/>
+          </a:p>
+        </p:txBody>
+      </p:sp>
+      <p:sp>
+        <p:nvSpPr>
+          <p:cNvPr id="10" name="Rectangle 9">
+            <a:extLst>
+              <a:ext uri="{FF2B5EF4-FFF2-40B4-BE49-F238E27FC236}">
+                <a16:creationId xmlns:a16="http://schemas.microsoft.com/office/drawing/2014/main" id="{899CA36F-C7CE-7A96-8087-7C4E0F719BEB}"/>
+              </a:ext>
+              <a:ext uri="{C183D7F6-B498-43B3-948B-1728B52AA6E4}">
+                <adec:decorative xmlns:adec="http://schemas.microsoft.com/office/drawing/2017/decorative" val="1"/>
+              </a:ext>
+            </a:extLst>
+          </p:cNvPr>
+          <p:cNvSpPr>
+            <a:spLocks noGrp="1" noRot="1" noChangeAspect="1" noMove="1" noResize="1" noEditPoints="1" noAdjustHandles="1" noChangeArrowheads="1" noChangeShapeType="1" noTextEdit="1"/>
+          </p:cNvSpPr>
+          <p:nvPr>
+            <p:extLst>
+              <p:ext uri="{386F3935-93C4-4BCD-93E2-E3B085C9AB24}">
+                <p16:designElem xmlns:p16="http://schemas.microsoft.com/office/powerpoint/2015/main" val="1"/>
+              </p:ext>
+            </p:extLst>
+          </p:nvPr>
+        </p:nvSpPr>
+        <p:spPr>
+          <a:xfrm flipH="1">
+            <a:off x="-1" y="-1"/>
+            <a:ext cx="12191998" cy="1590742"/>
+          </a:xfrm>
+          <a:prstGeom prst="rect">
+            <a:avLst/>
+          </a:prstGeom>
+          <a:gradFill>
+            <a:gsLst>
+              <a:gs pos="0">
+                <a:srgbClr val="000000"/>
+              </a:gs>
+              <a:gs pos="100000">
+                <a:schemeClr val="accent1">
+                  <a:lumMod val="75000"/>
+                </a:schemeClr>
+              </a:gs>
+            </a:gsLst>
+            <a:lin ang="8400000" scaled="0"/>
+          </a:gradFill>
+          <a:ln>
+            <a:noFill/>
+          </a:ln>
+        </p:spPr>
+        <p:style>
+          <a:lnRef idx="2">
+            <a:schemeClr val="accent1">
+              <a:shade val="50000"/>
+            </a:schemeClr>
+          </a:lnRef>
+          <a:fillRef idx="1">
+            <a:schemeClr val="accent1"/>
+          </a:fillRef>
+          <a:effectRef idx="0">
+            <a:schemeClr val="accent1"/>
+          </a:effectRef>
+          <a:fontRef idx="minor">
+            <a:schemeClr val="lt1"/>
+          </a:fontRef>
+        </p:style>
+        <p:txBody>
+          <a:bodyPr rtlCol="0" anchor="ctr"/>
+          <a:lstStyle/>
+          <a:p>
+            <a:pPr algn="ctr"/>
+            <a:endParaRPr lang="en-US"/>
+          </a:p>
+        </p:txBody>
+      </p:sp>
+      <p:sp>
+        <p:nvSpPr>
+          <p:cNvPr id="12" name="Rectangle 11">
+            <a:extLst>
+              <a:ext uri="{FF2B5EF4-FFF2-40B4-BE49-F238E27FC236}">
+                <a16:creationId xmlns:a16="http://schemas.microsoft.com/office/drawing/2014/main" id="{85022F72-9A9A-BE9F-379D-EB7DE8ACD742}"/>
+              </a:ext>
+              <a:ext uri="{C183D7F6-B498-43B3-948B-1728B52AA6E4}">
+                <adec:decorative xmlns:adec="http://schemas.microsoft.com/office/drawing/2017/decorative" val="1"/>
+              </a:ext>
+            </a:extLst>
+          </p:cNvPr>
+          <p:cNvSpPr>
+            <a:spLocks noGrp="1" noRot="1" noChangeAspect="1" noMove="1" noResize="1" noEditPoints="1" noAdjustHandles="1" noChangeArrowheads="1" noChangeShapeType="1" noTextEdit="1"/>
+          </p:cNvSpPr>
+          <p:nvPr>
+            <p:extLst>
+              <p:ext uri="{386F3935-93C4-4BCD-93E2-E3B085C9AB24}">
+                <p16:designElem xmlns:p16="http://schemas.microsoft.com/office/powerpoint/2015/main" val="1"/>
+              </p:ext>
+            </p:extLst>
+          </p:nvPr>
+        </p:nvSpPr>
+        <p:spPr>
+          <a:xfrm rot="10800000" flipH="1">
+            <a:off x="-3" y="0"/>
+            <a:ext cx="8115306" cy="1590742"/>
+          </a:xfrm>
+          <a:prstGeom prst="rect">
+            <a:avLst/>
+          </a:prstGeom>
+          <a:gradFill>
+            <a:gsLst>
+              <a:gs pos="20000">
+                <a:schemeClr val="accent1">
+                  <a:alpha val="0"/>
+                </a:schemeClr>
+              </a:gs>
+              <a:gs pos="100000">
+                <a:schemeClr val="accent1">
+                  <a:lumMod val="50000"/>
+                  <a:alpha val="55000"/>
+                </a:schemeClr>
+              </a:gs>
+            </a:gsLst>
+            <a:lin ang="13800000" scaled="0"/>
+          </a:gradFill>
+          <a:ln>
+            <a:noFill/>
+          </a:ln>
+        </p:spPr>
+        <p:style>
+          <a:lnRef idx="2">
+            <a:schemeClr val="accent1">
+              <a:shade val="50000"/>
+            </a:schemeClr>
+          </a:lnRef>
+          <a:fillRef idx="1">
+            <a:schemeClr val="accent1"/>
+          </a:fillRef>
+          <a:effectRef idx="0">
+            <a:schemeClr val="accent1"/>
+          </a:effectRef>
+          <a:fontRef idx="minor">
+            <a:schemeClr val="lt1"/>
+          </a:fontRef>
+        </p:style>
+        <p:txBody>
+          <a:bodyPr rtlCol="0" anchor="ctr"/>
+          <a:lstStyle/>
+          <a:p>
+            <a:pPr algn="ctr"/>
+            <a:endParaRPr lang="en-US"/>
+          </a:p>
+        </p:txBody>
+      </p:sp>
+      <p:sp>
+        <p:nvSpPr>
+          <p:cNvPr id="14" name="Rectangle 13">
+            <a:extLst>
+              <a:ext uri="{FF2B5EF4-FFF2-40B4-BE49-F238E27FC236}">
+                <a16:creationId xmlns:a16="http://schemas.microsoft.com/office/drawing/2014/main" id="{D057BF5F-849C-071E-19DD-C5FB7CB9778D}"/>
+              </a:ext>
+              <a:ext uri="{C183D7F6-B498-43B3-948B-1728B52AA6E4}">
+                <adec:decorative xmlns:adec="http://schemas.microsoft.com/office/drawing/2017/decorative" val="1"/>
+              </a:ext>
+            </a:extLst>
+          </p:cNvPr>
+          <p:cNvSpPr>
+            <a:spLocks noGrp="1" noRot="1" noChangeAspect="1" noMove="1" noResize="1" noEditPoints="1" noAdjustHandles="1" noChangeArrowheads="1" noChangeShapeType="1" noTextEdit="1"/>
+          </p:cNvSpPr>
+          <p:nvPr>
+            <p:extLst>
+              <p:ext uri="{386F3935-93C4-4BCD-93E2-E3B085C9AB24}">
+                <p16:designElem xmlns:p16="http://schemas.microsoft.com/office/powerpoint/2015/main" val="1"/>
+              </p:ext>
+            </p:extLst>
+          </p:nvPr>
+        </p:nvSpPr>
+        <p:spPr>
+          <a:xfrm flipH="1">
+            <a:off x="8115299" y="-1"/>
+            <a:ext cx="4076698" cy="1590742"/>
+          </a:xfrm>
+          <a:prstGeom prst="rect">
+            <a:avLst/>
+          </a:prstGeom>
+          <a:gradFill>
+            <a:gsLst>
+              <a:gs pos="0">
+                <a:schemeClr val="accent1">
+                  <a:alpha val="66000"/>
+                </a:schemeClr>
+              </a:gs>
+              <a:gs pos="100000">
+                <a:srgbClr val="000000">
+                  <a:alpha val="30000"/>
+                </a:srgbClr>
+              </a:gs>
+            </a:gsLst>
+            <a:lin ang="13200000" scaled="0"/>
+          </a:gradFill>
+          <a:ln>
+            <a:noFill/>
+          </a:ln>
+        </p:spPr>
+        <p:style>
+          <a:lnRef idx="2">
+            <a:schemeClr val="accent1">
+              <a:shade val="50000"/>
+            </a:schemeClr>
+          </a:lnRef>
+          <a:fillRef idx="1">
+            <a:schemeClr val="accent1"/>
+          </a:fillRef>
+          <a:effectRef idx="0">
+            <a:schemeClr val="accent1"/>
+          </a:effectRef>
+          <a:fontRef idx="minor">
+            <a:schemeClr val="lt1"/>
+          </a:fontRef>
+        </p:style>
+        <p:txBody>
+          <a:bodyPr rtlCol="0" anchor="ctr"/>
+          <a:lstStyle/>
+          <a:p>
+            <a:pPr algn="ctr"/>
+            <a:endParaRPr lang="en-US"/>
+          </a:p>
+        </p:txBody>
+      </p:sp>
+      <p:sp>
+        <p:nvSpPr>
+          <p:cNvPr id="16" name="Rectangle 15">
+            <a:extLst>
+              <a:ext uri="{FF2B5EF4-FFF2-40B4-BE49-F238E27FC236}">
+                <a16:creationId xmlns:a16="http://schemas.microsoft.com/office/drawing/2014/main" id="{03A49C3F-39AF-7116-9323-CCAC92BC8C39}"/>
+              </a:ext>
+              <a:ext uri="{C183D7F6-B498-43B3-948B-1728B52AA6E4}">
+                <adec:decorative xmlns:adec="http://schemas.microsoft.com/office/drawing/2017/decorative" val="1"/>
+              </a:ext>
+            </a:extLst>
+          </p:cNvPr>
+          <p:cNvSpPr>
+            <a:spLocks noGrp="1" noRot="1" noChangeAspect="1" noMove="1" noResize="1" noEditPoints="1" noAdjustHandles="1" noChangeArrowheads="1" noChangeShapeType="1" noTextEdit="1"/>
+          </p:cNvSpPr>
+          <p:nvPr>
+            <p:extLst>
+              <p:ext uri="{386F3935-93C4-4BCD-93E2-E3B085C9AB24}">
+                <p16:designElem xmlns:p16="http://schemas.microsoft.com/office/powerpoint/2015/main" val="1"/>
+              </p:ext>
+            </p:extLst>
+          </p:nvPr>
+        </p:nvSpPr>
+        <p:spPr>
+          <a:xfrm>
+            <a:off x="459350" y="-1"/>
+            <a:ext cx="11732646" cy="1597433"/>
+          </a:xfrm>
+          <a:prstGeom prst="rect">
+            <a:avLst/>
+          </a:prstGeom>
+          <a:gradFill>
+            <a:gsLst>
+              <a:gs pos="50000">
+                <a:srgbClr val="000000">
+                  <a:alpha val="0"/>
+                </a:srgbClr>
+              </a:gs>
+              <a:gs pos="99000">
+                <a:schemeClr val="accent1">
+                  <a:lumMod val="50000"/>
+                  <a:alpha val="52000"/>
+                </a:schemeClr>
+              </a:gs>
+            </a:gsLst>
+            <a:lin ang="16800000" scaled="0"/>
+          </a:gradFill>
+          <a:ln>
+            <a:noFill/>
+          </a:ln>
+        </p:spPr>
+        <p:style>
+          <a:lnRef idx="2">
+            <a:schemeClr val="accent1">
+              <a:shade val="50000"/>
+            </a:schemeClr>
+          </a:lnRef>
+          <a:fillRef idx="1">
+            <a:schemeClr val="accent1"/>
+          </a:fillRef>
+          <a:effectRef idx="0">
+            <a:schemeClr val="accent1"/>
+          </a:effectRef>
+          <a:fontRef idx="minor">
+            <a:schemeClr val="lt1"/>
+          </a:fontRef>
+        </p:style>
+        <p:txBody>
+          <a:bodyPr rtlCol="0" anchor="ctr"/>
+          <a:lstStyle/>
+          <a:p>
+            <a:pPr algn="ctr"/>
+            <a:endParaRPr lang="en-US"/>
+          </a:p>
+        </p:txBody>
+      </p:sp>
+      <p:pic>
+        <p:nvPicPr>
+          <p:cNvPr id="19" name="Immagine 18" descr="Immagine che contiene testo, schermata, Carattere, linea&#10;&#10;Il contenuto generato dall'IA potrebbe non essere corretto.">
+            <a:extLst>
+              <a:ext uri="{FF2B5EF4-FFF2-40B4-BE49-F238E27FC236}">
+                <a16:creationId xmlns:a16="http://schemas.microsoft.com/office/drawing/2014/main" id="{FEA84B33-404E-B3E4-015E-29479760DBF3}"/>
+              </a:ext>
+            </a:extLst>
+          </p:cNvPr>
+          <p:cNvPicPr>
+            <a:picLocks noChangeAspect="1"/>
+          </p:cNvPicPr>
+          <p:nvPr/>
+        </p:nvPicPr>
+        <p:blipFill>
+          <a:blip r:embed="rId3"/>
+          <a:stretch>
+            <a:fillRect/>
+          </a:stretch>
+        </p:blipFill>
+        <p:spPr>
+          <a:xfrm>
+            <a:off x="972218" y="1856251"/>
+            <a:ext cx="10798868" cy="4256023"/>
+          </a:xfrm>
+          <a:prstGeom prst="rect">
+            <a:avLst/>
+          </a:prstGeom>
+          <a:ln w="28575">
+            <a:solidFill>
+              <a:schemeClr val="tx1"/>
+            </a:solidFill>
+          </a:ln>
+        </p:spPr>
+      </p:pic>
+      <p:sp>
+        <p:nvSpPr>
+          <p:cNvPr id="2" name="Titolo 1">
+            <a:extLst>
+              <a:ext uri="{FF2B5EF4-FFF2-40B4-BE49-F238E27FC236}">
+                <a16:creationId xmlns:a16="http://schemas.microsoft.com/office/drawing/2014/main" id="{5C99F065-883E-1456-E986-2AADB729E649}"/>
+              </a:ext>
+            </a:extLst>
+          </p:cNvPr>
+          <p:cNvSpPr>
+            <a:spLocks noGrp="1"/>
+          </p:cNvSpPr>
+          <p:nvPr>
+            <p:ph type="title"/>
+          </p:nvPr>
+        </p:nvSpPr>
+        <p:spPr>
+          <a:xfrm>
+            <a:off x="1371599" y="294538"/>
+            <a:ext cx="9895951" cy="1033669"/>
+          </a:xfrm>
+        </p:spPr>
+        <p:txBody>
+          <a:bodyPr>
+            <a:normAutofit/>
+          </a:bodyPr>
+          <a:lstStyle/>
+          <a:p>
+            <a:r>
+              <a:rPr lang="it-CH" sz="4000" b="0" i="0" u="none" strike="noStrike" dirty="0">
+                <a:solidFill>
+                  <a:srgbClr val="FFFFFF"/>
+                </a:solidFill>
+                <a:effectLst/>
+                <a:latin typeface="-webkit-standard"/>
+              </a:rPr>
+              <a:t>Dataset analysis - 1</a:t>
+            </a:r>
+            <a:endParaRPr lang="it-IT" sz="4000" dirty="0">
+              <a:solidFill>
+                <a:srgbClr val="FFFFFF"/>
+              </a:solidFill>
+            </a:endParaRPr>
+          </a:p>
+        </p:txBody>
+      </p:sp>
+      <p:sp>
+        <p:nvSpPr>
+          <p:cNvPr id="3" name="Segnaposto numero diapositiva 2">
+            <a:extLst>
+              <a:ext uri="{FF2B5EF4-FFF2-40B4-BE49-F238E27FC236}">
+                <a16:creationId xmlns:a16="http://schemas.microsoft.com/office/drawing/2014/main" id="{2E4611B6-836E-2983-F20D-AD859896CDEC}"/>
+              </a:ext>
+            </a:extLst>
+          </p:cNvPr>
+          <p:cNvSpPr>
+            <a:spLocks noGrp="1"/>
+          </p:cNvSpPr>
+          <p:nvPr>
+            <p:ph type="sldNum" sz="quarter" idx="12"/>
+          </p:nvPr>
+        </p:nvSpPr>
+        <p:spPr/>
+        <p:txBody>
+          <a:bodyPr/>
+          <a:lstStyle/>
+          <a:p>
+            <a:fld id="{DDE33EDC-7B95-0F48-AC5F-7FA810C80076}" type="slidenum">
+              <a:rPr lang="it-IT" smtClean="0"/>
+              <a:t>6</a:t>
+            </a:fld>
+            <a:endParaRPr lang="it-IT"/>
+          </a:p>
+        </p:txBody>
+      </p:sp>
+    </p:spTree>
+    <p:extLst>
+      <p:ext uri="{BB962C8B-B14F-4D97-AF65-F5344CB8AC3E}">
+        <p14:creationId xmlns:p14="http://schemas.microsoft.com/office/powerpoint/2010/main" val="3328919079"/>
+      </p:ext>
+    </p:extLst>
+  </p:cSld>
+  <p:clrMapOvr>
+    <a:masterClrMapping/>
+  </p:clrMapOvr>
+  <p:timing>
+    <p:tnLst>
+      <p:par>
+        <p:cTn id="1" dur="indefinite" restart="never" nodeType="tmRoot">
+          <p:childTnLst>
+            <p:seq concurrent="1" nextAc="seek">
+              <p:cTn id="2" dur="indefinite" nodeType="mainSeq">
+                <p:childTnLst>
+                  <p:par>
+                    <p:cTn id="3" fill="hold">
+                      <p:stCondLst>
+                        <p:cond delay="indefinite"/>
+                        <p:cond evt="onBegin" delay="0">
+                          <p:tn val="2"/>
+                        </p:cond>
+                      </p:stCondLst>
+                      <p:childTnLst>
                         <p:par>
-                          <p:cTn id="7" fill="hold">
+                          <p:cTn id="4" fill="hold">
                             <p:stCondLst>
                               <p:cond delay="0"/>
                             </p:stCondLst>
                             <p:childTnLst>
                               <p:par>
-                                <p:cTn id="8" presetID="1" presetClass="entr" presetSubtype="0" fill="hold" nodeType="afterEffect">
+                                <p:cTn id="5" presetID="1" presetClass="entr" presetSubtype="0" fill="hold" nodeType="afterEffect">
                                   <p:stCondLst>
                                     <p:cond delay="0"/>
                                   </p:stCondLst>
                                   <p:childTnLst>
                                     <p:set>
                                       <p:cBhvr>
-                                        <p:cTn id="9" dur="1" fill="hold">
+                                        <p:cTn id="6" dur="1" fill="hold">
                                           <p:stCondLst>
                                             <p:cond delay="0"/>
                                           </p:stCondLst>
@@ -7264,7 +9111,7 @@
 </p:sld>
 </file>
 
-<file path=ppt/slides/slide5.xml><?xml version="1.0" encoding="utf-8"?>
+<file path=ppt/slides/slide7.xml><?xml version="1.0" encoding="utf-8"?>
 <p:sld xmlns:a="http://schemas.openxmlformats.org/drawingml/2006/main" xmlns:r="http://schemas.openxmlformats.org/officeDocument/2006/relationships" xmlns:p="http://schemas.openxmlformats.org/presentationml/2006/main">
   <p:cSld>
     <p:bg>
@@ -7740,7 +9587,7 @@
           <a:p>
             <a:fld id="{DDE33EDC-7B95-0F48-AC5F-7FA810C80076}" type="slidenum">
               <a:rPr lang="it-IT" smtClean="0"/>
-              <a:t>5</a:t>
+              <a:t>7</a:t>
             </a:fld>
             <a:endParaRPr lang="it-IT"/>
           </a:p>
@@ -7794,7 +9641,7 @@
 </p:sld>
 </file>
 
-<file path=ppt/slides/slide6.xml><?xml version="1.0" encoding="utf-8"?>
+<file path=ppt/slides/slide8.xml><?xml version="1.0" encoding="utf-8"?>
 <p:sld xmlns:a="http://schemas.openxmlformats.org/drawingml/2006/main" xmlns:r="http://schemas.openxmlformats.org/officeDocument/2006/relationships" xmlns:p="http://schemas.openxmlformats.org/presentationml/2006/main">
   <p:cSld>
     <p:bg>
@@ -8305,7 +10152,7 @@
           <a:p>
             <a:fld id="{DDE33EDC-7B95-0F48-AC5F-7FA810C80076}" type="slidenum">
               <a:rPr lang="it-IT" smtClean="0"/>
-              <a:t>6</a:t>
+              <a:t>8</a:t>
             </a:fld>
             <a:endParaRPr lang="it-IT"/>
           </a:p>
@@ -8324,7 +10171,7 @@
 </p:sld>
 </file>
 
-<file path=ppt/slides/slide7.xml><?xml version="1.0" encoding="utf-8"?>
+<file path=ppt/slides/slide9.xml><?xml version="1.0" encoding="utf-8"?>
 <p:sld xmlns:a="http://schemas.openxmlformats.org/drawingml/2006/main" xmlns:r="http://schemas.openxmlformats.org/officeDocument/2006/relationships" xmlns:p="http://schemas.openxmlformats.org/presentationml/2006/main">
   <p:cSld>
     <p:bg>
@@ -8835,7 +10682,7 @@
           <a:p>
             <a:fld id="{DDE33EDC-7B95-0F48-AC5F-7FA810C80076}" type="slidenum">
               <a:rPr lang="it-IT" smtClean="0"/>
-              <a:t>7</a:t>
+              <a:t>9</a:t>
             </a:fld>
             <a:endParaRPr lang="it-IT"/>
           </a:p>
@@ -8845,536 +10692,6 @@
     <p:extLst>
       <p:ext uri="{BB962C8B-B14F-4D97-AF65-F5344CB8AC3E}">
         <p14:creationId xmlns:p14="http://schemas.microsoft.com/office/powerpoint/2010/main" val="2804421655"/>
-      </p:ext>
-    </p:extLst>
-  </p:cSld>
-  <p:clrMapOvr>
-    <a:masterClrMapping/>
-  </p:clrMapOvr>
-</p:sld>
-</file>
-
-<file path=ppt/slides/slide8.xml><?xml version="1.0" encoding="utf-8"?>
-<p:sld xmlns:a="http://schemas.openxmlformats.org/drawingml/2006/main" xmlns:r="http://schemas.openxmlformats.org/officeDocument/2006/relationships" xmlns:p="http://schemas.openxmlformats.org/presentationml/2006/main">
-  <p:cSld>
-    <p:bg>
-      <p:bgPr>
-        <a:solidFill>
-          <a:schemeClr val="bg1"/>
-        </a:solidFill>
-        <a:effectLst/>
-      </p:bgPr>
-    </p:bg>
-    <p:spTree>
-      <p:nvGrpSpPr>
-        <p:cNvPr id="1" name="">
-          <a:extLst>
-            <a:ext uri="{FF2B5EF4-FFF2-40B4-BE49-F238E27FC236}">
-              <a16:creationId xmlns:a16="http://schemas.microsoft.com/office/drawing/2014/main" id="{5F912492-67B8-2101-C0C8-C5F31E1241D8}"/>
-            </a:ext>
-          </a:extLst>
-        </p:cNvPr>
-        <p:cNvGrpSpPr/>
-        <p:nvPr/>
-      </p:nvGrpSpPr>
-      <p:grpSpPr>
-        <a:xfrm>
-          <a:off x="0" y="0"/>
-          <a:ext cx="0" cy="0"/>
-          <a:chOff x="0" y="0"/>
-          <a:chExt cx="0" cy="0"/>
-        </a:xfrm>
-      </p:grpSpPr>
-      <p:sp useBgFill="1">
-        <p:nvSpPr>
-          <p:cNvPr id="8" name="Rectangle 7">
-            <a:extLst>
-              <a:ext uri="{FF2B5EF4-FFF2-40B4-BE49-F238E27FC236}">
-                <a16:creationId xmlns:a16="http://schemas.microsoft.com/office/drawing/2014/main" id="{2D71D30C-6832-0873-CC41-C3B83B5A838D}"/>
-              </a:ext>
-              <a:ext uri="{C183D7F6-B498-43B3-948B-1728B52AA6E4}">
-                <adec:decorative xmlns:adec="http://schemas.microsoft.com/office/drawing/2017/decorative" val="1"/>
-              </a:ext>
-            </a:extLst>
-          </p:cNvPr>
-          <p:cNvSpPr>
-            <a:spLocks noGrp="1" noRot="1" noChangeAspect="1" noMove="1" noResize="1" noEditPoints="1" noAdjustHandles="1" noChangeArrowheads="1" noChangeShapeType="1" noTextEdit="1"/>
-          </p:cNvSpPr>
-          <p:nvPr>
-            <p:extLst>
-              <p:ext uri="{386F3935-93C4-4BCD-93E2-E3B085C9AB24}">
-                <p16:designElem xmlns:p16="http://schemas.microsoft.com/office/powerpoint/2015/main" val="1"/>
-              </p:ext>
-            </p:extLst>
-          </p:nvPr>
-        </p:nvSpPr>
-        <p:spPr>
-          <a:xfrm>
-            <a:off x="0" y="0"/>
-            <a:ext cx="12192000" cy="6858000"/>
-          </a:xfrm>
-          <a:prstGeom prst="rect">
-            <a:avLst/>
-          </a:prstGeom>
-          <a:ln w="12700" cap="flat" cmpd="sng" algn="ctr">
-            <a:noFill/>
-            <a:prstDash val="solid"/>
-            <a:miter lim="800000"/>
-          </a:ln>
-          <a:effectLst/>
-          <a:extLst>
-            <a:ext uri="{91240B29-F687-4F45-9708-019B960494DF}">
-              <a14:hiddenLine xmlns:a14="http://schemas.microsoft.com/office/drawing/2010/main" w="12700" cap="flat" cmpd="sng" algn="ctr">
-                <a:solidFill>
-                  <a:schemeClr val="accent1">
-                    <a:shade val="50000"/>
-                  </a:schemeClr>
-                </a:solidFill>
-                <a:prstDash val="solid"/>
-                <a:miter lim="800000"/>
-              </a14:hiddenLine>
-            </a:ext>
-          </a:extLst>
-        </p:spPr>
-        <p:style>
-          <a:lnRef idx="2">
-            <a:schemeClr val="accent1">
-              <a:shade val="50000"/>
-            </a:schemeClr>
-          </a:lnRef>
-          <a:fillRef idx="1">
-            <a:schemeClr val="accent1"/>
-          </a:fillRef>
-          <a:effectRef idx="0">
-            <a:schemeClr val="accent1"/>
-          </a:effectRef>
-          <a:fontRef idx="minor">
-            <a:schemeClr val="lt1"/>
-          </a:fontRef>
-        </p:style>
-        <p:txBody>
-          <a:bodyPr rtlCol="0" anchor="ctr"/>
-          <a:lstStyle/>
-          <a:p>
-            <a:pPr algn="ctr"/>
-            <a:endParaRPr lang="en-US"/>
-          </a:p>
-        </p:txBody>
-      </p:sp>
-      <p:sp>
-        <p:nvSpPr>
-          <p:cNvPr id="10" name="Rectangle 9">
-            <a:extLst>
-              <a:ext uri="{FF2B5EF4-FFF2-40B4-BE49-F238E27FC236}">
-                <a16:creationId xmlns:a16="http://schemas.microsoft.com/office/drawing/2014/main" id="{780B01E4-9DCA-6905-724D-669D36ADB123}"/>
-              </a:ext>
-              <a:ext uri="{C183D7F6-B498-43B3-948B-1728B52AA6E4}">
-                <adec:decorative xmlns:adec="http://schemas.microsoft.com/office/drawing/2017/decorative" val="1"/>
-              </a:ext>
-            </a:extLst>
-          </p:cNvPr>
-          <p:cNvSpPr>
-            <a:spLocks noGrp="1" noRot="1" noChangeAspect="1" noMove="1" noResize="1" noEditPoints="1" noAdjustHandles="1" noChangeArrowheads="1" noChangeShapeType="1" noTextEdit="1"/>
-          </p:cNvSpPr>
-          <p:nvPr>
-            <p:extLst>
-              <p:ext uri="{386F3935-93C4-4BCD-93E2-E3B085C9AB24}">
-                <p16:designElem xmlns:p16="http://schemas.microsoft.com/office/powerpoint/2015/main" val="1"/>
-              </p:ext>
-            </p:extLst>
-          </p:nvPr>
-        </p:nvSpPr>
-        <p:spPr>
-          <a:xfrm flipH="1">
-            <a:off x="-1" y="-1"/>
-            <a:ext cx="12191998" cy="1590742"/>
-          </a:xfrm>
-          <a:prstGeom prst="rect">
-            <a:avLst/>
-          </a:prstGeom>
-          <a:gradFill>
-            <a:gsLst>
-              <a:gs pos="0">
-                <a:srgbClr val="000000"/>
-              </a:gs>
-              <a:gs pos="100000">
-                <a:schemeClr val="accent1">
-                  <a:lumMod val="75000"/>
-                </a:schemeClr>
-              </a:gs>
-            </a:gsLst>
-            <a:lin ang="8400000" scaled="0"/>
-          </a:gradFill>
-          <a:ln>
-            <a:noFill/>
-          </a:ln>
-        </p:spPr>
-        <p:style>
-          <a:lnRef idx="2">
-            <a:schemeClr val="accent1">
-              <a:shade val="50000"/>
-            </a:schemeClr>
-          </a:lnRef>
-          <a:fillRef idx="1">
-            <a:schemeClr val="accent1"/>
-          </a:fillRef>
-          <a:effectRef idx="0">
-            <a:schemeClr val="accent1"/>
-          </a:effectRef>
-          <a:fontRef idx="minor">
-            <a:schemeClr val="lt1"/>
-          </a:fontRef>
-        </p:style>
-        <p:txBody>
-          <a:bodyPr rtlCol="0" anchor="ctr"/>
-          <a:lstStyle/>
-          <a:p>
-            <a:pPr algn="ctr"/>
-            <a:endParaRPr lang="en-US"/>
-          </a:p>
-        </p:txBody>
-      </p:sp>
-      <p:sp>
-        <p:nvSpPr>
-          <p:cNvPr id="12" name="Rectangle 11">
-            <a:extLst>
-              <a:ext uri="{FF2B5EF4-FFF2-40B4-BE49-F238E27FC236}">
-                <a16:creationId xmlns:a16="http://schemas.microsoft.com/office/drawing/2014/main" id="{DCB1AF8C-BDD9-7009-34DA-78F1517D1110}"/>
-              </a:ext>
-              <a:ext uri="{C183D7F6-B498-43B3-948B-1728B52AA6E4}">
-                <adec:decorative xmlns:adec="http://schemas.microsoft.com/office/drawing/2017/decorative" val="1"/>
-              </a:ext>
-            </a:extLst>
-          </p:cNvPr>
-          <p:cNvSpPr>
-            <a:spLocks noGrp="1" noRot="1" noChangeAspect="1" noMove="1" noResize="1" noEditPoints="1" noAdjustHandles="1" noChangeArrowheads="1" noChangeShapeType="1" noTextEdit="1"/>
-          </p:cNvSpPr>
-          <p:nvPr>
-            <p:extLst>
-              <p:ext uri="{386F3935-93C4-4BCD-93E2-E3B085C9AB24}">
-                <p16:designElem xmlns:p16="http://schemas.microsoft.com/office/powerpoint/2015/main" val="1"/>
-              </p:ext>
-            </p:extLst>
-          </p:nvPr>
-        </p:nvSpPr>
-        <p:spPr>
-          <a:xfrm rot="10800000" flipH="1">
-            <a:off x="-3" y="0"/>
-            <a:ext cx="8115306" cy="1590742"/>
-          </a:xfrm>
-          <a:prstGeom prst="rect">
-            <a:avLst/>
-          </a:prstGeom>
-          <a:gradFill>
-            <a:gsLst>
-              <a:gs pos="20000">
-                <a:schemeClr val="accent1">
-                  <a:alpha val="0"/>
-                </a:schemeClr>
-              </a:gs>
-              <a:gs pos="100000">
-                <a:schemeClr val="accent1">
-                  <a:lumMod val="50000"/>
-                  <a:alpha val="55000"/>
-                </a:schemeClr>
-              </a:gs>
-            </a:gsLst>
-            <a:lin ang="13800000" scaled="0"/>
-          </a:gradFill>
-          <a:ln>
-            <a:noFill/>
-          </a:ln>
-        </p:spPr>
-        <p:style>
-          <a:lnRef idx="2">
-            <a:schemeClr val="accent1">
-              <a:shade val="50000"/>
-            </a:schemeClr>
-          </a:lnRef>
-          <a:fillRef idx="1">
-            <a:schemeClr val="accent1"/>
-          </a:fillRef>
-          <a:effectRef idx="0">
-            <a:schemeClr val="accent1"/>
-          </a:effectRef>
-          <a:fontRef idx="minor">
-            <a:schemeClr val="lt1"/>
-          </a:fontRef>
-        </p:style>
-        <p:txBody>
-          <a:bodyPr rtlCol="0" anchor="ctr"/>
-          <a:lstStyle/>
-          <a:p>
-            <a:pPr algn="ctr"/>
-            <a:endParaRPr lang="en-US"/>
-          </a:p>
-        </p:txBody>
-      </p:sp>
-      <p:sp>
-        <p:nvSpPr>
-          <p:cNvPr id="14" name="Rectangle 13">
-            <a:extLst>
-              <a:ext uri="{FF2B5EF4-FFF2-40B4-BE49-F238E27FC236}">
-                <a16:creationId xmlns:a16="http://schemas.microsoft.com/office/drawing/2014/main" id="{D5363DD8-730B-C9FB-D843-17996D4BC8A7}"/>
-              </a:ext>
-              <a:ext uri="{C183D7F6-B498-43B3-948B-1728B52AA6E4}">
-                <adec:decorative xmlns:adec="http://schemas.microsoft.com/office/drawing/2017/decorative" val="1"/>
-              </a:ext>
-            </a:extLst>
-          </p:cNvPr>
-          <p:cNvSpPr>
-            <a:spLocks noGrp="1" noRot="1" noChangeAspect="1" noMove="1" noResize="1" noEditPoints="1" noAdjustHandles="1" noChangeArrowheads="1" noChangeShapeType="1" noTextEdit="1"/>
-          </p:cNvSpPr>
-          <p:nvPr>
-            <p:extLst>
-              <p:ext uri="{386F3935-93C4-4BCD-93E2-E3B085C9AB24}">
-                <p16:designElem xmlns:p16="http://schemas.microsoft.com/office/powerpoint/2015/main" val="1"/>
-              </p:ext>
-            </p:extLst>
-          </p:nvPr>
-        </p:nvSpPr>
-        <p:spPr>
-          <a:xfrm flipH="1">
-            <a:off x="8115299" y="-1"/>
-            <a:ext cx="4076698" cy="1590742"/>
-          </a:xfrm>
-          <a:prstGeom prst="rect">
-            <a:avLst/>
-          </a:prstGeom>
-          <a:gradFill>
-            <a:gsLst>
-              <a:gs pos="0">
-                <a:schemeClr val="accent1">
-                  <a:alpha val="66000"/>
-                </a:schemeClr>
-              </a:gs>
-              <a:gs pos="100000">
-                <a:srgbClr val="000000">
-                  <a:alpha val="30000"/>
-                </a:srgbClr>
-              </a:gs>
-            </a:gsLst>
-            <a:lin ang="13200000" scaled="0"/>
-          </a:gradFill>
-          <a:ln>
-            <a:noFill/>
-          </a:ln>
-        </p:spPr>
-        <p:style>
-          <a:lnRef idx="2">
-            <a:schemeClr val="accent1">
-              <a:shade val="50000"/>
-            </a:schemeClr>
-          </a:lnRef>
-          <a:fillRef idx="1">
-            <a:schemeClr val="accent1"/>
-          </a:fillRef>
-          <a:effectRef idx="0">
-            <a:schemeClr val="accent1"/>
-          </a:effectRef>
-          <a:fontRef idx="minor">
-            <a:schemeClr val="lt1"/>
-          </a:fontRef>
-        </p:style>
-        <p:txBody>
-          <a:bodyPr rtlCol="0" anchor="ctr"/>
-          <a:lstStyle/>
-          <a:p>
-            <a:pPr algn="ctr"/>
-            <a:endParaRPr lang="en-US"/>
-          </a:p>
-        </p:txBody>
-      </p:sp>
-      <p:sp>
-        <p:nvSpPr>
-          <p:cNvPr id="16" name="Rectangle 15">
-            <a:extLst>
-              <a:ext uri="{FF2B5EF4-FFF2-40B4-BE49-F238E27FC236}">
-                <a16:creationId xmlns:a16="http://schemas.microsoft.com/office/drawing/2014/main" id="{D8E40328-92E0-E068-C270-295ECD0F78B7}"/>
-              </a:ext>
-              <a:ext uri="{C183D7F6-B498-43B3-948B-1728B52AA6E4}">
-                <adec:decorative xmlns:adec="http://schemas.microsoft.com/office/drawing/2017/decorative" val="1"/>
-              </a:ext>
-            </a:extLst>
-          </p:cNvPr>
-          <p:cNvSpPr>
-            <a:spLocks noGrp="1" noRot="1" noChangeAspect="1" noMove="1" noResize="1" noEditPoints="1" noAdjustHandles="1" noChangeArrowheads="1" noChangeShapeType="1" noTextEdit="1"/>
-          </p:cNvSpPr>
-          <p:nvPr>
-            <p:extLst>
-              <p:ext uri="{386F3935-93C4-4BCD-93E2-E3B085C9AB24}">
-                <p16:designElem xmlns:p16="http://schemas.microsoft.com/office/powerpoint/2015/main" val="1"/>
-              </p:ext>
-            </p:extLst>
-          </p:nvPr>
-        </p:nvSpPr>
-        <p:spPr>
-          <a:xfrm>
-            <a:off x="459350" y="-1"/>
-            <a:ext cx="11732646" cy="1597433"/>
-          </a:xfrm>
-          <a:prstGeom prst="rect">
-            <a:avLst/>
-          </a:prstGeom>
-          <a:gradFill>
-            <a:gsLst>
-              <a:gs pos="50000">
-                <a:srgbClr val="000000">
-                  <a:alpha val="0"/>
-                </a:srgbClr>
-              </a:gs>
-              <a:gs pos="99000">
-                <a:schemeClr val="accent1">
-                  <a:lumMod val="50000"/>
-                  <a:alpha val="52000"/>
-                </a:schemeClr>
-              </a:gs>
-            </a:gsLst>
-            <a:lin ang="16800000" scaled="0"/>
-          </a:gradFill>
-          <a:ln>
-            <a:noFill/>
-          </a:ln>
-        </p:spPr>
-        <p:style>
-          <a:lnRef idx="2">
-            <a:schemeClr val="accent1">
-              <a:shade val="50000"/>
-            </a:schemeClr>
-          </a:lnRef>
-          <a:fillRef idx="1">
-            <a:schemeClr val="accent1"/>
-          </a:fillRef>
-          <a:effectRef idx="0">
-            <a:schemeClr val="accent1"/>
-          </a:effectRef>
-          <a:fontRef idx="minor">
-            <a:schemeClr val="lt1"/>
-          </a:fontRef>
-        </p:style>
-        <p:txBody>
-          <a:bodyPr rtlCol="0" anchor="ctr"/>
-          <a:lstStyle/>
-          <a:p>
-            <a:pPr algn="ctr"/>
-            <a:endParaRPr lang="en-US"/>
-          </a:p>
-        </p:txBody>
-      </p:sp>
-      <p:sp>
-        <p:nvSpPr>
-          <p:cNvPr id="2" name="Titolo 1">
-            <a:extLst>
-              <a:ext uri="{FF2B5EF4-FFF2-40B4-BE49-F238E27FC236}">
-                <a16:creationId xmlns:a16="http://schemas.microsoft.com/office/drawing/2014/main" id="{65D22C9A-C26E-57EE-FA0C-95E27EC92C76}"/>
-              </a:ext>
-            </a:extLst>
-          </p:cNvPr>
-          <p:cNvSpPr>
-            <a:spLocks noGrp="1"/>
-          </p:cNvSpPr>
-          <p:nvPr>
-            <p:ph type="title"/>
-          </p:nvPr>
-        </p:nvSpPr>
-        <p:spPr>
-          <a:xfrm>
-            <a:off x="1371599" y="294538"/>
-            <a:ext cx="9895951" cy="1033669"/>
-          </a:xfrm>
-        </p:spPr>
-        <p:txBody>
-          <a:bodyPr>
-            <a:normAutofit/>
-          </a:bodyPr>
-          <a:lstStyle/>
-          <a:p>
-            <a:r>
-              <a:rPr lang="it-CH" sz="4000" b="0" i="0" u="none" strike="noStrike" dirty="0">
-                <a:solidFill>
-                  <a:srgbClr val="FFFFFF"/>
-                </a:solidFill>
-                <a:effectLst/>
-                <a:latin typeface="-webkit-standard"/>
-              </a:rPr>
-              <a:t>Accademic pressure related to study hours</a:t>
-            </a:r>
-            <a:endParaRPr lang="it-IT" sz="4000" dirty="0">
-              <a:solidFill>
-                <a:srgbClr val="FFFFFF"/>
-              </a:solidFill>
-            </a:endParaRPr>
-          </a:p>
-        </p:txBody>
-      </p:sp>
-      <p:pic>
-        <p:nvPicPr>
-          <p:cNvPr id="4" name="Immagine 3" descr="Immagine che contiene testo, diagramma, linea, Diagramma&#10;&#10;Il contenuto generato dall'IA potrebbe non essere corretto.">
-            <a:extLst>
-              <a:ext uri="{FF2B5EF4-FFF2-40B4-BE49-F238E27FC236}">
-                <a16:creationId xmlns:a16="http://schemas.microsoft.com/office/drawing/2014/main" id="{66979F32-F28D-3B5A-B65B-064545EB0794}"/>
-              </a:ext>
-            </a:extLst>
-          </p:cNvPr>
-          <p:cNvPicPr>
-            <a:picLocks noChangeAspect="1"/>
-          </p:cNvPicPr>
-          <p:nvPr/>
-        </p:nvPicPr>
-        <p:blipFill>
-          <a:blip r:embed="rId3"/>
-          <a:stretch>
-            <a:fillRect/>
-          </a:stretch>
-        </p:blipFill>
-        <p:spPr>
-          <a:xfrm>
-            <a:off x="609599" y="1885279"/>
-            <a:ext cx="10904887" cy="4297807"/>
-          </a:xfrm>
-          <a:prstGeom prst="rect">
-            <a:avLst/>
-          </a:prstGeom>
-          <a:ln w="28575">
-            <a:solidFill>
-              <a:schemeClr val="tx1"/>
-            </a:solidFill>
-          </a:ln>
-        </p:spPr>
-      </p:pic>
-      <p:sp>
-        <p:nvSpPr>
-          <p:cNvPr id="3" name="Segnaposto numero diapositiva 2">
-            <a:extLst>
-              <a:ext uri="{FF2B5EF4-FFF2-40B4-BE49-F238E27FC236}">
-                <a16:creationId xmlns:a16="http://schemas.microsoft.com/office/drawing/2014/main" id="{B277B9F8-9CC0-420D-B53B-56A2307A083B}"/>
-              </a:ext>
-            </a:extLst>
-          </p:cNvPr>
-          <p:cNvSpPr>
-            <a:spLocks noGrp="1"/>
-          </p:cNvSpPr>
-          <p:nvPr>
-            <p:ph type="sldNum" sz="quarter" idx="12"/>
-          </p:nvPr>
-        </p:nvSpPr>
-        <p:spPr/>
-        <p:txBody>
-          <a:bodyPr/>
-          <a:lstStyle/>
-          <a:p>
-            <a:fld id="{DDE33EDC-7B95-0F48-AC5F-7FA810C80076}" type="slidenum">
-              <a:rPr lang="it-IT" smtClean="0"/>
-              <a:t>8</a:t>
-            </a:fld>
-            <a:endParaRPr lang="it-IT"/>
-          </a:p>
-        </p:txBody>
-      </p:sp>
-    </p:spTree>
-    <p:extLst>
-      <p:ext uri="{BB962C8B-B14F-4D97-AF65-F5344CB8AC3E}">
-        <p14:creationId xmlns:p14="http://schemas.microsoft.com/office/powerpoint/2010/main" val="722361553"/>
       </p:ext>
     </p:extLst>
   </p:cSld>

</xml_diff>